<commit_message>
Included battery in regulation market, and updated descriptions
</commit_message>
<xml_diff>
--- a/Meetings/Advisory board meeting.pptx
+++ b/Meetings/Advisory board meeting.pptx
@@ -5,55 +5,64 @@
     <p:sldMasterId id="2147483648" r:id="rId1"/>
   </p:sldMasterIdLst>
   <p:notesMasterIdLst>
-    <p:notesMasterId r:id="rId9"/>
+    <p:notesMasterId r:id="rId18"/>
   </p:notesMasterIdLst>
   <p:handoutMasterIdLst>
-    <p:handoutMasterId r:id="rId10"/>
+    <p:handoutMasterId r:id="rId19"/>
   </p:handoutMasterIdLst>
   <p:sldIdLst>
     <p:sldId id="261" r:id="rId2"/>
     <p:sldId id="267" r:id="rId3"/>
     <p:sldId id="262" r:id="rId4"/>
-    <p:sldId id="265" r:id="rId5"/>
-    <p:sldId id="266" r:id="rId6"/>
-    <p:sldId id="268" r:id="rId7"/>
-    <p:sldId id="260" r:id="rId8"/>
+    <p:sldId id="269" r:id="rId5"/>
+    <p:sldId id="272" r:id="rId6"/>
+    <p:sldId id="271" r:id="rId7"/>
+    <p:sldId id="270" r:id="rId8"/>
+    <p:sldId id="273" r:id="rId9"/>
+    <p:sldId id="274" r:id="rId10"/>
+    <p:sldId id="277" r:id="rId11"/>
+    <p:sldId id="275" r:id="rId12"/>
+    <p:sldId id="278" r:id="rId13"/>
+    <p:sldId id="279" r:id="rId14"/>
+    <p:sldId id="280" r:id="rId15"/>
+    <p:sldId id="276" r:id="rId16"/>
+    <p:sldId id="260" r:id="rId17"/>
   </p:sldIdLst>
   <p:sldSz cx="12188825" cy="6858000"/>
   <p:notesSz cx="6797675" cy="9926638"/>
   <p:embeddedFontLst>
     <p:embeddedFont>
       <p:font typeface="AU Passata" panose="020B0604020202020204" charset="0"/>
-      <p:regular r:id="rId11"/>
-      <p:bold r:id="rId12"/>
+      <p:regular r:id="rId20"/>
+      <p:bold r:id="rId21"/>
     </p:embeddedFont>
     <p:embeddedFont>
       <p:font typeface="AU Passata Light" panose="020B0604020202020204" charset="0"/>
-      <p:regular r:id="rId13"/>
-      <p:bold r:id="rId14"/>
+      <p:regular r:id="rId22"/>
+      <p:bold r:id="rId23"/>
     </p:embeddedFont>
     <p:embeddedFont>
       <p:font typeface="AU Peto" panose="020B0604020202020204" charset="0"/>
-      <p:regular r:id="rId15"/>
-      <p:bold r:id="rId16"/>
+      <p:regular r:id="rId24"/>
+      <p:bold r:id="rId25"/>
     </p:embeddedFont>
     <p:embeddedFont>
       <p:font typeface="Calibri" panose="020F0502020204030204" pitchFamily="34" charset="0"/>
-      <p:regular r:id="rId17"/>
-      <p:bold r:id="rId18"/>
-      <p:italic r:id="rId19"/>
-      <p:boldItalic r:id="rId20"/>
+      <p:regular r:id="rId26"/>
+      <p:bold r:id="rId27"/>
+      <p:italic r:id="rId28"/>
+      <p:boldItalic r:id="rId29"/>
     </p:embeddedFont>
     <p:embeddedFont>
       <p:font typeface="Georgia" panose="02040502050405020303" pitchFamily="18" charset="0"/>
-      <p:regular r:id="rId21"/>
-      <p:bold r:id="rId22"/>
-      <p:italic r:id="rId23"/>
-      <p:boldItalic r:id="rId24"/>
+      <p:regular r:id="rId30"/>
+      <p:bold r:id="rId31"/>
+      <p:italic r:id="rId32"/>
+      <p:boldItalic r:id="rId33"/>
     </p:embeddedFont>
     <p:embeddedFont>
       <p:font typeface="Wingdings 3" panose="05040102010807070707" pitchFamily="18" charset="2"/>
-      <p:regular r:id="rId25"/>
+      <p:regular r:id="rId34"/>
     </p:embeddedFont>
   </p:embeddedFontLst>
   <p:defaultTextStyle>
@@ -1010,7 +1019,7 @@
               <a:pPr>
                 <a:defRPr/>
               </a:pPr>
-              <a:t>7</a:t>
+              <a:t>16</a:t>
             </a:fld>
             <a:endParaRPr lang="en-GB" dirty="0"/>
           </a:p>
@@ -1634,7 +1643,7 @@
             <a:fld id="{78417F83-4CBA-48F2-BAD0-783AE3701E32}" type="datetimeFigureOut">
               <a:rPr lang="da-DK" smtClean="0"/>
               <a:pPr/>
-              <a:t>20-04-2020</a:t>
+              <a:t>23-04-2020</a:t>
             </a:fld>
             <a:r>
               <a:rPr lang="da-DK" dirty="0"/>
@@ -1844,7 +1853,7 @@
             <a:fld id="{78417F83-4CBA-48F2-BAD0-783AE3701E32}" type="datetimeFigureOut">
               <a:rPr lang="da-DK" smtClean="0"/>
               <a:pPr/>
-              <a:t>20-04-2020</a:t>
+              <a:t>23-04-2020</a:t>
             </a:fld>
             <a:r>
               <a:rPr lang="da-DK" dirty="0"/>
@@ -2085,7 +2094,7 @@
             <a:fld id="{78417F83-4CBA-48F2-BAD0-783AE3701E32}" type="datetimeFigureOut">
               <a:rPr lang="da-DK" smtClean="0"/>
               <a:pPr/>
-              <a:t>20-04-2020</a:t>
+              <a:t>23-04-2020</a:t>
             </a:fld>
             <a:r>
               <a:rPr lang="da-DK" dirty="0"/>
@@ -2255,7 +2264,7 @@
             <a:fld id="{78417F83-4CBA-48F2-BAD0-783AE3701E32}" type="datetimeFigureOut">
               <a:rPr lang="da-DK" smtClean="0"/>
               <a:pPr/>
-              <a:t>20-04-2020</a:t>
+              <a:t>23-04-2020</a:t>
             </a:fld>
             <a:r>
               <a:rPr lang="da-DK" dirty="0"/>
@@ -2429,7 +2438,7 @@
             <a:fld id="{78417F83-4CBA-48F2-BAD0-783AE3701E32}" type="datetimeFigureOut">
               <a:rPr lang="da-DK" smtClean="0"/>
               <a:pPr/>
-              <a:t>20-04-2020</a:t>
+              <a:t>23-04-2020</a:t>
             </a:fld>
             <a:r>
               <a:rPr lang="da-DK" dirty="0"/>
@@ -2766,7 +2775,7 @@
             <a:fld id="{78417F83-4CBA-48F2-BAD0-783AE3701E32}" type="datetimeFigureOut">
               <a:rPr lang="da-DK" smtClean="0"/>
               <a:pPr/>
-              <a:t>20-04-2020</a:t>
+              <a:t>23-04-2020</a:t>
             </a:fld>
             <a:r>
               <a:rPr lang="da-DK" dirty="0"/>
@@ -2937,7 +2946,7 @@
             <a:fld id="{78417F83-4CBA-48F2-BAD0-783AE3701E32}" type="datetimeFigureOut">
               <a:rPr lang="da-DK" smtClean="0"/>
               <a:pPr/>
-              <a:t>20-04-2020</a:t>
+              <a:t>23-04-2020</a:t>
             </a:fld>
             <a:r>
               <a:rPr lang="da-DK" dirty="0"/>
@@ -3133,7 +3142,7 @@
             <a:fld id="{78417F83-4CBA-48F2-BAD0-783AE3701E32}" type="datetimeFigureOut">
               <a:rPr lang="da-DK" smtClean="0"/>
               <a:pPr/>
-              <a:t>20-04-2020</a:t>
+              <a:t>23-04-2020</a:t>
             </a:fld>
             <a:r>
               <a:rPr lang="da-DK" dirty="0"/>
@@ -3302,7 +3311,7 @@
             <a:fld id="{78417F83-4CBA-48F2-BAD0-783AE3701E32}" type="datetimeFigureOut">
               <a:rPr lang="da-DK" smtClean="0"/>
               <a:pPr/>
-              <a:t>20-04-2020</a:t>
+              <a:t>23-04-2020</a:t>
             </a:fld>
             <a:r>
               <a:rPr lang="da-DK" dirty="0"/>
@@ -3456,7 +3465,7 @@
             <a:fld id="{78417F83-4CBA-48F2-BAD0-783AE3701E32}" type="datetimeFigureOut">
               <a:rPr lang="da-DK" smtClean="0"/>
               <a:pPr/>
-              <a:t>20-04-2020</a:t>
+              <a:t>23-04-2020</a:t>
             </a:fld>
             <a:r>
               <a:rPr lang="da-DK" dirty="0"/>
@@ -4345,7 +4354,7 @@
             <a:fld id="{78417F83-4CBA-48F2-BAD0-783AE3701E32}" type="datetimeFigureOut">
               <a:rPr lang="da-DK" smtClean="0"/>
               <a:pPr/>
-              <a:t>20-04-2020</a:t>
+              <a:t>23-04-2020</a:t>
             </a:fld>
             <a:r>
               <a:rPr lang="da-DK" dirty="0"/>
@@ -5158,7 +5167,7 @@
             <a:fld id="{78417F83-4CBA-48F2-BAD0-783AE3701E32}" type="datetimeFigureOut">
               <a:rPr lang="da-DK" smtClean="0"/>
               <a:pPr/>
-              <a:t>20-04-2020</a:t>
+              <a:t>23-04-2020</a:t>
             </a:fld>
             <a:r>
               <a:rPr lang="da-DK" dirty="0"/>
@@ -5388,7 +5397,7 @@
             <a:fld id="{78417F83-4CBA-48F2-BAD0-783AE3701E32}" type="datetimeFigureOut">
               <a:rPr lang="da-DK" smtClean="0"/>
               <a:pPr/>
-              <a:t>20-04-2020</a:t>
+              <a:t>23-04-2020</a:t>
             </a:fld>
             <a:r>
               <a:rPr lang="da-DK" dirty="0"/>
@@ -6091,7 +6100,7 @@
             <a:fld id="{78417F83-4CBA-48F2-BAD0-783AE3701E32}" type="datetimeFigureOut">
               <a:rPr lang="da-DK" smtClean="0"/>
               <a:pPr/>
-              <a:t>20-04-2020</a:t>
+              <a:t>23-04-2020</a:t>
             </a:fld>
             <a:r>
               <a:rPr lang="da-DK" dirty="0"/>
@@ -6382,7 +6391,7 @@
             <a:fld id="{78417F83-4CBA-48F2-BAD0-783AE3701E32}" type="datetimeFigureOut">
               <a:rPr lang="da-DK" smtClean="0"/>
               <a:pPr/>
-              <a:t>20-04-2020</a:t>
+              <a:t>23-04-2020</a:t>
             </a:fld>
             <a:r>
               <a:rPr lang="da-DK" dirty="0"/>
@@ -6756,7 +6765,7 @@
             <a:fld id="{78417F83-4CBA-48F2-BAD0-783AE3701E32}" type="datetimeFigureOut">
               <a:rPr lang="da-DK" smtClean="0"/>
               <a:pPr/>
-              <a:t>20-04-2020</a:t>
+              <a:t>23-04-2020</a:t>
             </a:fld>
             <a:r>
               <a:rPr lang="da-DK" dirty="0"/>
@@ -7183,7 +7192,7 @@
             <a:fld id="{78417F83-4CBA-48F2-BAD0-783AE3701E32}" type="datetimeFigureOut">
               <a:rPr lang="da-DK" smtClean="0"/>
               <a:pPr/>
-              <a:t>20-04-2020</a:t>
+              <a:t>23-04-2020</a:t>
             </a:fld>
             <a:r>
               <a:rPr lang="da-DK" dirty="0"/>
@@ -7623,7 +7632,7 @@
             <a:fld id="{78417F83-4CBA-48F2-BAD0-783AE3701E32}" type="datetimeFigureOut">
               <a:rPr lang="da-DK" smtClean="0"/>
               <a:pPr/>
-              <a:t>20-04-2020</a:t>
+              <a:t>23-04-2020</a:t>
             </a:fld>
             <a:r>
               <a:rPr lang="da-DK" dirty="0"/>
@@ -7791,7 +7800,7 @@
             <a:fld id="{78417F83-4CBA-48F2-BAD0-783AE3701E32}" type="datetimeFigureOut">
               <a:rPr lang="da-DK" smtClean="0"/>
               <a:pPr/>
-              <a:t>20-04-2020</a:t>
+              <a:t>23-04-2020</a:t>
             </a:fld>
             <a:r>
               <a:rPr lang="da-DK" dirty="0"/>
@@ -7972,7 +7981,7 @@
             <a:fld id="{78417F83-4CBA-48F2-BAD0-783AE3701E32}" type="datetimeFigureOut">
               <a:rPr lang="da-DK" smtClean="0"/>
               <a:pPr/>
-              <a:t>20-04-2020</a:t>
+              <a:t>23-04-2020</a:t>
             </a:fld>
             <a:r>
               <a:rPr lang="da-DK" dirty="0"/>
@@ -8741,7 +8750,7 @@
             <a:fld id="{78417F83-4CBA-48F2-BAD0-783AE3701E32}" type="datetimeFigureOut">
               <a:rPr lang="da-DK" smtClean="0"/>
               <a:pPr/>
-              <a:t>20-04-2020</a:t>
+              <a:t>23-04-2020</a:t>
             </a:fld>
             <a:r>
               <a:rPr lang="da-DK"/>
@@ -9357,8 +9366,8 @@
           <a:lstStyle/>
           <a:p>
             <a:r>
-              <a:rPr lang="da-DK" dirty="0"/>
-              <a:t>Historisk Spot + systemydelses markeds model</a:t>
+              <a:rPr lang="en-US" dirty="0"/>
+              <a:t>Historic Spot + ancillary services model</a:t>
             </a:r>
           </a:p>
         </p:txBody>
@@ -9370,6 +9379,2587 @@
     <p:extLst>
       <p:ext uri="{BB962C8B-B14F-4D97-AF65-F5344CB8AC3E}">
         <p14:creationId xmlns:p14="http://schemas.microsoft.com/office/powerpoint/2010/main" val="948320703"/>
+      </p:ext>
+    </p:extLst>
+  </p:cSld>
+  <p:clrMapOvr>
+    <a:masterClrMapping/>
+  </p:clrMapOvr>
+</p:sld>
+</file>
+
+<file path=ppt/slides/slide10.xml><?xml version="1.0" encoding="utf-8"?>
+<p:sld xmlns:a="http://schemas.openxmlformats.org/drawingml/2006/main" xmlns:r="http://schemas.openxmlformats.org/officeDocument/2006/relationships" xmlns:p="http://schemas.openxmlformats.org/presentationml/2006/main">
+  <p:cSld>
+    <p:spTree>
+      <p:nvGrpSpPr>
+        <p:cNvPr id="1" name=""/>
+        <p:cNvGrpSpPr/>
+        <p:nvPr/>
+      </p:nvGrpSpPr>
+      <p:grpSpPr>
+        <a:xfrm>
+          <a:off x="0" y="0"/>
+          <a:ext cx="0" cy="0"/>
+          <a:chOff x="0" y="0"/>
+          <a:chExt cx="0" cy="0"/>
+        </a:xfrm>
+      </p:grpSpPr>
+      <p:sp>
+        <p:nvSpPr>
+          <p:cNvPr id="2" name="Title 1">
+            <a:extLst>
+              <a:ext uri="{FF2B5EF4-FFF2-40B4-BE49-F238E27FC236}">
+                <a16:creationId xmlns:a16="http://schemas.microsoft.com/office/drawing/2014/main" id="{DEE635FE-42F5-4953-9485-0B352728FC85}"/>
+              </a:ext>
+            </a:extLst>
+          </p:cNvPr>
+          <p:cNvSpPr>
+            <a:spLocks noGrp="1"/>
+          </p:cNvSpPr>
+          <p:nvPr>
+            <p:ph type="title"/>
+          </p:nvPr>
+        </p:nvSpPr>
+        <p:spPr/>
+        <p:txBody>
+          <a:bodyPr/>
+          <a:lstStyle/>
+          <a:p>
+            <a:r>
+              <a:rPr lang="en-US" dirty="0"/>
+              <a:t>Results – Individual technologies</a:t>
+            </a:r>
+          </a:p>
+        </p:txBody>
+      </p:sp>
+      <p:sp>
+        <p:nvSpPr>
+          <p:cNvPr id="3" name="Content Placeholder 2">
+            <a:extLst>
+              <a:ext uri="{FF2B5EF4-FFF2-40B4-BE49-F238E27FC236}">
+                <a16:creationId xmlns:a16="http://schemas.microsoft.com/office/drawing/2014/main" id="{F855907B-33B5-43EC-AFE4-1A37B8292C52}"/>
+              </a:ext>
+            </a:extLst>
+          </p:cNvPr>
+          <p:cNvSpPr>
+            <a:spLocks noGrp="1"/>
+          </p:cNvSpPr>
+          <p:nvPr>
+            <p:ph idx="1"/>
+          </p:nvPr>
+        </p:nvSpPr>
+        <p:spPr/>
+        <p:txBody>
+          <a:bodyPr/>
+          <a:lstStyle/>
+          <a:p>
+            <a:r>
+              <a:rPr lang="en-US" dirty="0"/>
+              <a:t>In the first study the individual technologies was investigated. </a:t>
+            </a:r>
+          </a:p>
+          <a:p>
+            <a:r>
+              <a:rPr lang="en-US" dirty="0"/>
+              <a:t>The study seeks to investigate how the individual technologies participate in the different power markets, and how much profit can be made.</a:t>
+            </a:r>
+          </a:p>
+          <a:p>
+            <a:r>
+              <a:rPr lang="en-US" dirty="0"/>
+              <a:t>A simulation across three years (2017, 2018, 2019) is performed. </a:t>
+            </a:r>
+          </a:p>
+        </p:txBody>
+      </p:sp>
+      <p:sp>
+        <p:nvSpPr>
+          <p:cNvPr id="4" name="Date Placeholder 3">
+            <a:extLst>
+              <a:ext uri="{FF2B5EF4-FFF2-40B4-BE49-F238E27FC236}">
+                <a16:creationId xmlns:a16="http://schemas.microsoft.com/office/drawing/2014/main" id="{30632F55-F2CB-4801-BFDD-790BCAA09179}"/>
+              </a:ext>
+            </a:extLst>
+          </p:cNvPr>
+          <p:cNvSpPr>
+            <a:spLocks noGrp="1"/>
+          </p:cNvSpPr>
+          <p:nvPr>
+            <p:ph type="dt" sz="half" idx="10"/>
+          </p:nvPr>
+        </p:nvSpPr>
+        <p:spPr/>
+        <p:txBody>
+          <a:bodyPr/>
+          <a:lstStyle/>
+          <a:p>
+            <a:fld id="{38980495-9955-4176-BE67-664C76541270}" type="datetime1">
+              <a:rPr lang="da-DK" smtClean="0"/>
+              <a:t>23-04-2020</a:t>
+            </a:fld>
+            <a:r>
+              <a:rPr lang="da-DK"/>
+              <a:t>21-04-2020</a:t>
+            </a:r>
+            <a:endParaRPr lang="da-DK" dirty="0"/>
+          </a:p>
+        </p:txBody>
+      </p:sp>
+    </p:spTree>
+    <p:extLst>
+      <p:ext uri="{BB962C8B-B14F-4D97-AF65-F5344CB8AC3E}">
+        <p14:creationId xmlns:p14="http://schemas.microsoft.com/office/powerpoint/2010/main" val="1271535919"/>
+      </p:ext>
+    </p:extLst>
+  </p:cSld>
+  <p:clrMapOvr>
+    <a:masterClrMapping/>
+  </p:clrMapOvr>
+</p:sld>
+</file>
+
+<file path=ppt/slides/slide11.xml><?xml version="1.0" encoding="utf-8"?>
+<p:sld xmlns:a="http://schemas.openxmlformats.org/drawingml/2006/main" xmlns:r="http://schemas.openxmlformats.org/officeDocument/2006/relationships" xmlns:p="http://schemas.openxmlformats.org/presentationml/2006/main">
+  <p:cSld>
+    <p:spTree>
+      <p:nvGrpSpPr>
+        <p:cNvPr id="1" name=""/>
+        <p:cNvGrpSpPr/>
+        <p:nvPr/>
+      </p:nvGrpSpPr>
+      <p:grpSpPr>
+        <a:xfrm>
+          <a:off x="0" y="0"/>
+          <a:ext cx="0" cy="0"/>
+          <a:chOff x="0" y="0"/>
+          <a:chExt cx="0" cy="0"/>
+        </a:xfrm>
+      </p:grpSpPr>
+      <p:graphicFrame>
+        <p:nvGraphicFramePr>
+          <p:cNvPr id="7" name="Table 3">
+            <a:extLst>
+              <a:ext uri="{FF2B5EF4-FFF2-40B4-BE49-F238E27FC236}">
+                <a16:creationId xmlns:a16="http://schemas.microsoft.com/office/drawing/2014/main" id="{FB6DFE97-C78E-4D16-AFB2-AA56F3406DF0}"/>
+              </a:ext>
+            </a:extLst>
+          </p:cNvPr>
+          <p:cNvGraphicFramePr>
+            <a:graphicFrameLocks noGrp="1"/>
+          </p:cNvGraphicFramePr>
+          <p:nvPr>
+            <p:extLst>
+              <p:ext uri="{D42A27DB-BD31-4B8C-83A1-F6EECF244321}">
+                <p14:modId xmlns:p14="http://schemas.microsoft.com/office/powerpoint/2010/main" val="278055111"/>
+              </p:ext>
+            </p:extLst>
+          </p:nvPr>
+        </p:nvGraphicFramePr>
+        <p:xfrm>
+          <a:off x="307148" y="1988840"/>
+          <a:ext cx="11538250" cy="3886647"/>
+        </p:xfrm>
+        <a:graphic>
+          <a:graphicData uri="http://schemas.openxmlformats.org/drawingml/2006/table">
+            <a:tbl>
+              <a:tblPr firstRow="1" bandRow="1">
+                <a:tableStyleId>{5C22544A-7EE6-4342-B048-85BDC9FD1C3A}</a:tableStyleId>
+              </a:tblPr>
+              <a:tblGrid>
+                <a:gridCol w="2307650">
+                  <a:extLst>
+                    <a:ext uri="{9D8B030D-6E8A-4147-A177-3AD203B41FA5}">
+                      <a16:colId xmlns:a16="http://schemas.microsoft.com/office/drawing/2014/main" val="3113571600"/>
+                    </a:ext>
+                  </a:extLst>
+                </a:gridCol>
+                <a:gridCol w="2307650">
+                  <a:extLst>
+                    <a:ext uri="{9D8B030D-6E8A-4147-A177-3AD203B41FA5}">
+                      <a16:colId xmlns:a16="http://schemas.microsoft.com/office/drawing/2014/main" val="2628223732"/>
+                    </a:ext>
+                  </a:extLst>
+                </a:gridCol>
+                <a:gridCol w="2307650">
+                  <a:extLst>
+                    <a:ext uri="{9D8B030D-6E8A-4147-A177-3AD203B41FA5}">
+                      <a16:colId xmlns:a16="http://schemas.microsoft.com/office/drawing/2014/main" val="1623126789"/>
+                    </a:ext>
+                  </a:extLst>
+                </a:gridCol>
+                <a:gridCol w="2307650">
+                  <a:extLst>
+                    <a:ext uri="{9D8B030D-6E8A-4147-A177-3AD203B41FA5}">
+                      <a16:colId xmlns:a16="http://schemas.microsoft.com/office/drawing/2014/main" val="491043896"/>
+                    </a:ext>
+                  </a:extLst>
+                </a:gridCol>
+                <a:gridCol w="2307650">
+                  <a:extLst>
+                    <a:ext uri="{9D8B030D-6E8A-4147-A177-3AD203B41FA5}">
+                      <a16:colId xmlns:a16="http://schemas.microsoft.com/office/drawing/2014/main" val="3298096351"/>
+                    </a:ext>
+                  </a:extLst>
+                </a:gridCol>
+              </a:tblGrid>
+              <a:tr h="997387">
+                <a:tc>
+                  <a:txBody>
+                    <a:bodyPr/>
+                    <a:lstStyle/>
+                    <a:p>
+                      <a:r>
+                        <a:rPr lang="en-US" dirty="0"/>
+                        <a:t>[1000 DKK/MW/year]</a:t>
+                      </a:r>
+                    </a:p>
+                  </a:txBody>
+                  <a:tcPr/>
+                </a:tc>
+                <a:tc>
+                  <a:txBody>
+                    <a:bodyPr/>
+                    <a:lstStyle/>
+                    <a:p>
+                      <a:r>
+                        <a:rPr lang="en-US" dirty="0"/>
+                        <a:t>Investment</a:t>
+                      </a:r>
+                    </a:p>
+                  </a:txBody>
+                  <a:tcPr/>
+                </a:tc>
+                <a:tc>
+                  <a:txBody>
+                    <a:bodyPr/>
+                    <a:lstStyle/>
+                    <a:p>
+                      <a:r>
+                        <a:rPr lang="en-US" dirty="0"/>
+                        <a:t>Spot market earnings</a:t>
+                      </a:r>
+                    </a:p>
+                  </a:txBody>
+                  <a:tcPr/>
+                </a:tc>
+                <a:tc>
+                  <a:txBody>
+                    <a:bodyPr/>
+                    <a:lstStyle/>
+                    <a:p>
+                      <a:r>
+                        <a:rPr lang="en-US" dirty="0"/>
+                        <a:t>Ancillary services markets earnings </a:t>
+                      </a:r>
+                    </a:p>
+                  </a:txBody>
+                  <a:tcPr/>
+                </a:tc>
+                <a:tc>
+                  <a:txBody>
+                    <a:bodyPr/>
+                    <a:lstStyle/>
+                    <a:p>
+                      <a:r>
+                        <a:rPr lang="en-US" dirty="0"/>
+                        <a:t>Secondary market earnings</a:t>
+                      </a:r>
+                    </a:p>
+                  </a:txBody>
+                  <a:tcPr/>
+                </a:tc>
+                <a:extLst>
+                  <a:ext uri="{0D108BD9-81ED-4DB2-BD59-A6C34878D82A}">
+                    <a16:rowId xmlns:a16="http://schemas.microsoft.com/office/drawing/2014/main" val="3744113494"/>
+                  </a:ext>
+                </a:extLst>
+              </a:tr>
+              <a:tr h="577852">
+                <a:tc>
+                  <a:txBody>
+                    <a:bodyPr/>
+                    <a:lstStyle/>
+                    <a:p>
+                      <a:r>
+                        <a:rPr lang="en-US" dirty="0"/>
+                        <a:t>Wind turbines</a:t>
+                      </a:r>
+                    </a:p>
+                  </a:txBody>
+                  <a:tcPr/>
+                </a:tc>
+                <a:tc>
+                  <a:txBody>
+                    <a:bodyPr/>
+                    <a:lstStyle/>
+                    <a:p>
+                      <a:pPr algn="r"/>
+                      <a:r>
+                        <a:rPr lang="en-US" dirty="0"/>
+                        <a:t>545</a:t>
+                      </a:r>
+                    </a:p>
+                  </a:txBody>
+                  <a:tcPr/>
+                </a:tc>
+                <a:tc>
+                  <a:txBody>
+                    <a:bodyPr/>
+                    <a:lstStyle/>
+                    <a:p>
+                      <a:pPr algn="r"/>
+                      <a:r>
+                        <a:rPr lang="en-US" dirty="0"/>
+                        <a:t>386</a:t>
+                      </a:r>
+                    </a:p>
+                  </a:txBody>
+                  <a:tcPr/>
+                </a:tc>
+                <a:tc>
+                  <a:txBody>
+                    <a:bodyPr/>
+                    <a:lstStyle/>
+                    <a:p>
+                      <a:pPr algn="r"/>
+                      <a:r>
+                        <a:rPr lang="en-US" dirty="0"/>
+                        <a:t>262</a:t>
+                      </a:r>
+                    </a:p>
+                  </a:txBody>
+                  <a:tcPr/>
+                </a:tc>
+                <a:tc>
+                  <a:txBody>
+                    <a:bodyPr/>
+                    <a:lstStyle/>
+                    <a:p>
+                      <a:pPr algn="r"/>
+                      <a:r>
+                        <a:rPr lang="en-US" dirty="0"/>
+                        <a:t>0</a:t>
+                      </a:r>
+                    </a:p>
+                  </a:txBody>
+                  <a:tcPr/>
+                </a:tc>
+                <a:extLst>
+                  <a:ext uri="{0D108BD9-81ED-4DB2-BD59-A6C34878D82A}">
+                    <a16:rowId xmlns:a16="http://schemas.microsoft.com/office/drawing/2014/main" val="3291003031"/>
+                  </a:ext>
+                </a:extLst>
+              </a:tr>
+              <a:tr h="577852">
+                <a:tc>
+                  <a:txBody>
+                    <a:bodyPr/>
+                    <a:lstStyle/>
+                    <a:p>
+                      <a:r>
+                        <a:rPr lang="en-US" dirty="0"/>
+                        <a:t>Solar PV</a:t>
+                      </a:r>
+                    </a:p>
+                  </a:txBody>
+                  <a:tcPr/>
+                </a:tc>
+                <a:tc>
+                  <a:txBody>
+                    <a:bodyPr/>
+                    <a:lstStyle/>
+                    <a:p>
+                      <a:pPr algn="r"/>
+                      <a:r>
+                        <a:rPr lang="en-US" dirty="0"/>
+                        <a:t>188</a:t>
+                      </a:r>
+                    </a:p>
+                  </a:txBody>
+                  <a:tcPr/>
+                </a:tc>
+                <a:tc>
+                  <a:txBody>
+                    <a:bodyPr/>
+                    <a:lstStyle/>
+                    <a:p>
+                      <a:pPr algn="r"/>
+                      <a:r>
+                        <a:rPr lang="en-US" dirty="0"/>
+                        <a:t>184</a:t>
+                      </a:r>
+                    </a:p>
+                  </a:txBody>
+                  <a:tcPr/>
+                </a:tc>
+                <a:tc>
+                  <a:txBody>
+                    <a:bodyPr/>
+                    <a:lstStyle/>
+                    <a:p>
+                      <a:pPr algn="r"/>
+                      <a:r>
+                        <a:rPr lang="en-US" dirty="0"/>
+                        <a:t>120</a:t>
+                      </a:r>
+                    </a:p>
+                  </a:txBody>
+                  <a:tcPr/>
+                </a:tc>
+                <a:tc>
+                  <a:txBody>
+                    <a:bodyPr/>
+                    <a:lstStyle/>
+                    <a:p>
+                      <a:pPr algn="r"/>
+                      <a:r>
+                        <a:rPr lang="en-US" dirty="0"/>
+                        <a:t>0</a:t>
+                      </a:r>
+                    </a:p>
+                  </a:txBody>
+                  <a:tcPr/>
+                </a:tc>
+                <a:extLst>
+                  <a:ext uri="{0D108BD9-81ED-4DB2-BD59-A6C34878D82A}">
+                    <a16:rowId xmlns:a16="http://schemas.microsoft.com/office/drawing/2014/main" val="2212190146"/>
+                  </a:ext>
+                </a:extLst>
+              </a:tr>
+              <a:tr h="577852">
+                <a:tc>
+                  <a:txBody>
+                    <a:bodyPr/>
+                    <a:lstStyle/>
+                    <a:p>
+                      <a:r>
+                        <a:rPr lang="en-US" dirty="0"/>
+                        <a:t>Electric Boiler</a:t>
+                      </a:r>
+                    </a:p>
+                  </a:txBody>
+                  <a:tcPr/>
+                </a:tc>
+                <a:tc>
+                  <a:txBody>
+                    <a:bodyPr/>
+                    <a:lstStyle/>
+                    <a:p>
+                      <a:pPr algn="r"/>
+                      <a:r>
+                        <a:rPr lang="en-US" dirty="0"/>
+                        <a:t>33</a:t>
+                      </a:r>
+                    </a:p>
+                  </a:txBody>
+                  <a:tcPr/>
+                </a:tc>
+                <a:tc>
+                  <a:txBody>
+                    <a:bodyPr/>
+                    <a:lstStyle/>
+                    <a:p>
+                      <a:pPr algn="r"/>
+                      <a:r>
+                        <a:rPr lang="en-US" dirty="0"/>
+                        <a:t>-424</a:t>
+                      </a:r>
+                    </a:p>
+                  </a:txBody>
+                  <a:tcPr/>
+                </a:tc>
+                <a:tc>
+                  <a:txBody>
+                    <a:bodyPr/>
+                    <a:lstStyle/>
+                    <a:p>
+                      <a:pPr algn="r"/>
+                      <a:r>
+                        <a:rPr lang="en-US" dirty="0"/>
+                        <a:t>571</a:t>
+                      </a:r>
+                    </a:p>
+                  </a:txBody>
+                  <a:tcPr/>
+                </a:tc>
+                <a:tc>
+                  <a:txBody>
+                    <a:bodyPr/>
+                    <a:lstStyle/>
+                    <a:p>
+                      <a:pPr algn="r"/>
+                      <a:r>
+                        <a:rPr lang="en-US" dirty="0"/>
+                        <a:t>70</a:t>
+                      </a:r>
+                    </a:p>
+                  </a:txBody>
+                  <a:tcPr/>
+                </a:tc>
+                <a:extLst>
+                  <a:ext uri="{0D108BD9-81ED-4DB2-BD59-A6C34878D82A}">
+                    <a16:rowId xmlns:a16="http://schemas.microsoft.com/office/drawing/2014/main" val="3681938821"/>
+                  </a:ext>
+                </a:extLst>
+              </a:tr>
+              <a:tr h="577852">
+                <a:tc>
+                  <a:txBody>
+                    <a:bodyPr/>
+                    <a:lstStyle/>
+                    <a:p>
+                      <a:r>
+                        <a:rPr lang="en-US" dirty="0"/>
+                        <a:t>Electrolyzer</a:t>
+                      </a:r>
+                    </a:p>
+                  </a:txBody>
+                  <a:tcPr/>
+                </a:tc>
+                <a:tc>
+                  <a:txBody>
+                    <a:bodyPr/>
+                    <a:lstStyle/>
+                    <a:p>
+                      <a:pPr algn="r"/>
+                      <a:r>
+                        <a:rPr lang="en-US" dirty="0"/>
+                        <a:t>470</a:t>
+                      </a:r>
+                    </a:p>
+                  </a:txBody>
+                  <a:tcPr/>
+                </a:tc>
+                <a:tc>
+                  <a:txBody>
+                    <a:bodyPr/>
+                    <a:lstStyle/>
+                    <a:p>
+                      <a:pPr algn="r"/>
+                      <a:r>
+                        <a:rPr lang="en-US" dirty="0"/>
+                        <a:t>-4.391</a:t>
+                      </a:r>
+                    </a:p>
+                  </a:txBody>
+                  <a:tcPr/>
+                </a:tc>
+                <a:tc>
+                  <a:txBody>
+                    <a:bodyPr/>
+                    <a:lstStyle/>
+                    <a:p>
+                      <a:pPr algn="r"/>
+                      <a:r>
+                        <a:rPr lang="en-US" dirty="0"/>
+                        <a:t>1.886</a:t>
+                      </a:r>
+                    </a:p>
+                  </a:txBody>
+                  <a:tcPr/>
+                </a:tc>
+                <a:tc>
+                  <a:txBody>
+                    <a:bodyPr/>
+                    <a:lstStyle/>
+                    <a:p>
+                      <a:pPr algn="r"/>
+                      <a:r>
+                        <a:rPr lang="en-US" dirty="0"/>
+                        <a:t>4.194</a:t>
+                      </a:r>
+                    </a:p>
+                  </a:txBody>
+                  <a:tcPr/>
+                </a:tc>
+                <a:extLst>
+                  <a:ext uri="{0D108BD9-81ED-4DB2-BD59-A6C34878D82A}">
+                    <a16:rowId xmlns:a16="http://schemas.microsoft.com/office/drawing/2014/main" val="3248509992"/>
+                  </a:ext>
+                </a:extLst>
+              </a:tr>
+              <a:tr h="577852">
+                <a:tc>
+                  <a:txBody>
+                    <a:bodyPr/>
+                    <a:lstStyle/>
+                    <a:p>
+                      <a:r>
+                        <a:rPr lang="en-US" dirty="0"/>
+                        <a:t>Battery</a:t>
+                      </a:r>
+                    </a:p>
+                  </a:txBody>
+                  <a:tcPr/>
+                </a:tc>
+                <a:tc>
+                  <a:txBody>
+                    <a:bodyPr/>
+                    <a:lstStyle/>
+                    <a:p>
+                      <a:pPr algn="r"/>
+                      <a:r>
+                        <a:rPr lang="en-US" dirty="0"/>
+                        <a:t>284</a:t>
+                      </a:r>
+                    </a:p>
+                  </a:txBody>
+                  <a:tcPr/>
+                </a:tc>
+                <a:tc>
+                  <a:txBody>
+                    <a:bodyPr/>
+                    <a:lstStyle/>
+                    <a:p>
+                      <a:pPr algn="r"/>
+                      <a:r>
+                        <a:rPr lang="en-US" dirty="0"/>
+                        <a:t>140</a:t>
+                      </a:r>
+                    </a:p>
+                  </a:txBody>
+                  <a:tcPr/>
+                </a:tc>
+                <a:tc>
+                  <a:txBody>
+                    <a:bodyPr/>
+                    <a:lstStyle/>
+                    <a:p>
+                      <a:pPr algn="r"/>
+                      <a:r>
+                        <a:rPr lang="en-US" dirty="0"/>
+                        <a:t>2.293</a:t>
+                      </a:r>
+                    </a:p>
+                  </a:txBody>
+                  <a:tcPr/>
+                </a:tc>
+                <a:tc>
+                  <a:txBody>
+                    <a:bodyPr/>
+                    <a:lstStyle/>
+                    <a:p>
+                      <a:pPr algn="r"/>
+                      <a:r>
+                        <a:rPr lang="en-US" dirty="0"/>
+                        <a:t>0</a:t>
+                      </a:r>
+                    </a:p>
+                  </a:txBody>
+                  <a:tcPr/>
+                </a:tc>
+                <a:extLst>
+                  <a:ext uri="{0D108BD9-81ED-4DB2-BD59-A6C34878D82A}">
+                    <a16:rowId xmlns:a16="http://schemas.microsoft.com/office/drawing/2014/main" val="1728117834"/>
+                  </a:ext>
+                </a:extLst>
+              </a:tr>
+            </a:tbl>
+          </a:graphicData>
+        </a:graphic>
+      </p:graphicFrame>
+      <p:sp>
+        <p:nvSpPr>
+          <p:cNvPr id="2" name="Title 1">
+            <a:extLst>
+              <a:ext uri="{FF2B5EF4-FFF2-40B4-BE49-F238E27FC236}">
+                <a16:creationId xmlns:a16="http://schemas.microsoft.com/office/drawing/2014/main" id="{A1B19434-EA79-4445-AB38-E8B17168FF4D}"/>
+              </a:ext>
+            </a:extLst>
+          </p:cNvPr>
+          <p:cNvSpPr>
+            <a:spLocks noGrp="1"/>
+          </p:cNvSpPr>
+          <p:nvPr>
+            <p:ph type="title"/>
+          </p:nvPr>
+        </p:nvSpPr>
+        <p:spPr/>
+        <p:txBody>
+          <a:bodyPr/>
+          <a:lstStyle/>
+          <a:p>
+            <a:r>
+              <a:rPr lang="en-US" dirty="0"/>
+              <a:t>Results – Individual technologies</a:t>
+            </a:r>
+          </a:p>
+        </p:txBody>
+      </p:sp>
+      <p:sp>
+        <p:nvSpPr>
+          <p:cNvPr id="4" name="Date Placeholder 3">
+            <a:extLst>
+              <a:ext uri="{FF2B5EF4-FFF2-40B4-BE49-F238E27FC236}">
+                <a16:creationId xmlns:a16="http://schemas.microsoft.com/office/drawing/2014/main" id="{722BCDE9-9B44-4AB9-B104-00DFA349CB55}"/>
+              </a:ext>
+            </a:extLst>
+          </p:cNvPr>
+          <p:cNvSpPr>
+            <a:spLocks noGrp="1"/>
+          </p:cNvSpPr>
+          <p:nvPr>
+            <p:ph type="dt" sz="half" idx="10"/>
+          </p:nvPr>
+        </p:nvSpPr>
+        <p:spPr/>
+        <p:txBody>
+          <a:bodyPr/>
+          <a:lstStyle/>
+          <a:p>
+            <a:fld id="{6BCE74DF-E3FF-4B6E-9793-4468AD2B28A8}" type="datetime1">
+              <a:rPr lang="da-DK" smtClean="0"/>
+              <a:t>23-04-2020</a:t>
+            </a:fld>
+            <a:r>
+              <a:rPr lang="da-DK"/>
+              <a:t>21-04-2020</a:t>
+            </a:r>
+            <a:endParaRPr lang="da-DK" dirty="0"/>
+          </a:p>
+        </p:txBody>
+      </p:sp>
+    </p:spTree>
+    <p:extLst>
+      <p:ext uri="{BB962C8B-B14F-4D97-AF65-F5344CB8AC3E}">
+        <p14:creationId xmlns:p14="http://schemas.microsoft.com/office/powerpoint/2010/main" val="2974252931"/>
+      </p:ext>
+    </p:extLst>
+  </p:cSld>
+  <p:clrMapOvr>
+    <a:masterClrMapping/>
+  </p:clrMapOvr>
+</p:sld>
+</file>
+
+<file path=ppt/slides/slide12.xml><?xml version="1.0" encoding="utf-8"?>
+<p:sld xmlns:a="http://schemas.openxmlformats.org/drawingml/2006/main" xmlns:r="http://schemas.openxmlformats.org/officeDocument/2006/relationships" xmlns:p="http://schemas.openxmlformats.org/presentationml/2006/main">
+  <p:cSld>
+    <p:spTree>
+      <p:nvGrpSpPr>
+        <p:cNvPr id="1" name=""/>
+        <p:cNvGrpSpPr/>
+        <p:nvPr/>
+      </p:nvGrpSpPr>
+      <p:grpSpPr>
+        <a:xfrm>
+          <a:off x="0" y="0"/>
+          <a:ext cx="0" cy="0"/>
+          <a:chOff x="0" y="0"/>
+          <a:chExt cx="0" cy="0"/>
+        </a:xfrm>
+      </p:grpSpPr>
+      <p:sp>
+        <p:nvSpPr>
+          <p:cNvPr id="2" name="Title 1">
+            <a:extLst>
+              <a:ext uri="{FF2B5EF4-FFF2-40B4-BE49-F238E27FC236}">
+                <a16:creationId xmlns:a16="http://schemas.microsoft.com/office/drawing/2014/main" id="{A1B19434-EA79-4445-AB38-E8B17168FF4D}"/>
+              </a:ext>
+            </a:extLst>
+          </p:cNvPr>
+          <p:cNvSpPr>
+            <a:spLocks noGrp="1"/>
+          </p:cNvSpPr>
+          <p:nvPr>
+            <p:ph type="title"/>
+          </p:nvPr>
+        </p:nvSpPr>
+        <p:spPr/>
+        <p:txBody>
+          <a:bodyPr/>
+          <a:lstStyle/>
+          <a:p>
+            <a:r>
+              <a:rPr lang="en-US" dirty="0"/>
+              <a:t>Results – Individual technologies</a:t>
+            </a:r>
+          </a:p>
+        </p:txBody>
+      </p:sp>
+      <p:graphicFrame>
+        <p:nvGraphicFramePr>
+          <p:cNvPr id="5" name="Table 5">
+            <a:extLst>
+              <a:ext uri="{FF2B5EF4-FFF2-40B4-BE49-F238E27FC236}">
+                <a16:creationId xmlns:a16="http://schemas.microsoft.com/office/drawing/2014/main" id="{C69253E2-9A87-454D-9853-121424886351}"/>
+              </a:ext>
+            </a:extLst>
+          </p:cNvPr>
+          <p:cNvGraphicFramePr>
+            <a:graphicFrameLocks noGrp="1"/>
+          </p:cNvGraphicFramePr>
+          <p:nvPr>
+            <p:ph idx="1"/>
+            <p:extLst>
+              <p:ext uri="{D42A27DB-BD31-4B8C-83A1-F6EECF244321}">
+                <p14:modId xmlns:p14="http://schemas.microsoft.com/office/powerpoint/2010/main" val="559146228"/>
+              </p:ext>
+            </p:extLst>
+          </p:nvPr>
+        </p:nvGraphicFramePr>
+        <p:xfrm>
+          <a:off x="315913" y="1988840"/>
+          <a:ext cx="11557000" cy="3672406"/>
+        </p:xfrm>
+        <a:graphic>
+          <a:graphicData uri="http://schemas.openxmlformats.org/drawingml/2006/table">
+            <a:tbl>
+              <a:tblPr firstRow="1" bandRow="1">
+                <a:tableStyleId>{5C22544A-7EE6-4342-B048-85BDC9FD1C3A}</a:tableStyleId>
+              </a:tblPr>
+              <a:tblGrid>
+                <a:gridCol w="1818059">
+                  <a:extLst>
+                    <a:ext uri="{9D8B030D-6E8A-4147-A177-3AD203B41FA5}">
+                      <a16:colId xmlns:a16="http://schemas.microsoft.com/office/drawing/2014/main" val="2725705660"/>
+                    </a:ext>
+                  </a:extLst>
+                </a:gridCol>
+                <a:gridCol w="1483941">
+                  <a:extLst>
+                    <a:ext uri="{9D8B030D-6E8A-4147-A177-3AD203B41FA5}">
+                      <a16:colId xmlns:a16="http://schemas.microsoft.com/office/drawing/2014/main" val="1000752805"/>
+                    </a:ext>
+                  </a:extLst>
+                </a:gridCol>
+                <a:gridCol w="1651000">
+                  <a:extLst>
+                    <a:ext uri="{9D8B030D-6E8A-4147-A177-3AD203B41FA5}">
+                      <a16:colId xmlns:a16="http://schemas.microsoft.com/office/drawing/2014/main" val="3398813878"/>
+                    </a:ext>
+                  </a:extLst>
+                </a:gridCol>
+                <a:gridCol w="1651000">
+                  <a:extLst>
+                    <a:ext uri="{9D8B030D-6E8A-4147-A177-3AD203B41FA5}">
+                      <a16:colId xmlns:a16="http://schemas.microsoft.com/office/drawing/2014/main" val="3494997816"/>
+                    </a:ext>
+                  </a:extLst>
+                </a:gridCol>
+                <a:gridCol w="1651000">
+                  <a:extLst>
+                    <a:ext uri="{9D8B030D-6E8A-4147-A177-3AD203B41FA5}">
+                      <a16:colId xmlns:a16="http://schemas.microsoft.com/office/drawing/2014/main" val="376175037"/>
+                    </a:ext>
+                  </a:extLst>
+                </a:gridCol>
+                <a:gridCol w="1651000">
+                  <a:extLst>
+                    <a:ext uri="{9D8B030D-6E8A-4147-A177-3AD203B41FA5}">
+                      <a16:colId xmlns:a16="http://schemas.microsoft.com/office/drawing/2014/main" val="1234112408"/>
+                    </a:ext>
+                  </a:extLst>
+                </a:gridCol>
+                <a:gridCol w="1651000">
+                  <a:extLst>
+                    <a:ext uri="{9D8B030D-6E8A-4147-A177-3AD203B41FA5}">
+                      <a16:colId xmlns:a16="http://schemas.microsoft.com/office/drawing/2014/main" val="345564488"/>
+                    </a:ext>
+                  </a:extLst>
+                </a:gridCol>
+              </a:tblGrid>
+              <a:tr h="942411">
+                <a:tc>
+                  <a:txBody>
+                    <a:bodyPr/>
+                    <a:lstStyle/>
+                    <a:p>
+                      <a:r>
+                        <a:rPr lang="en-US" dirty="0"/>
+                        <a:t>[1000 DKK/MW/year]</a:t>
+                      </a:r>
+                    </a:p>
+                  </a:txBody>
+                  <a:tcPr/>
+                </a:tc>
+                <a:tc>
+                  <a:txBody>
+                    <a:bodyPr/>
+                    <a:lstStyle/>
+                    <a:p>
+                      <a:r>
+                        <a:rPr lang="en-US" dirty="0"/>
+                        <a:t>Spot</a:t>
+                      </a:r>
+                    </a:p>
+                  </a:txBody>
+                  <a:tcPr/>
+                </a:tc>
+                <a:tc>
+                  <a:txBody>
+                    <a:bodyPr/>
+                    <a:lstStyle/>
+                    <a:p>
+                      <a:r>
+                        <a:rPr lang="en-US" dirty="0"/>
+                        <a:t>FCR up</a:t>
+                      </a:r>
+                    </a:p>
+                  </a:txBody>
+                  <a:tcPr/>
+                </a:tc>
+                <a:tc>
+                  <a:txBody>
+                    <a:bodyPr/>
+                    <a:lstStyle/>
+                    <a:p>
+                      <a:r>
+                        <a:rPr lang="en-US" dirty="0"/>
+                        <a:t>FCR down</a:t>
+                      </a:r>
+                    </a:p>
+                  </a:txBody>
+                  <a:tcPr/>
+                </a:tc>
+                <a:tc>
+                  <a:txBody>
+                    <a:bodyPr/>
+                    <a:lstStyle/>
+                    <a:p>
+                      <a:r>
+                        <a:rPr lang="en-US" dirty="0" err="1"/>
+                        <a:t>aFRR</a:t>
+                      </a:r>
+                      <a:endParaRPr lang="en-US" dirty="0"/>
+                    </a:p>
+                  </a:txBody>
+                  <a:tcPr/>
+                </a:tc>
+                <a:tc>
+                  <a:txBody>
+                    <a:bodyPr/>
+                    <a:lstStyle/>
+                    <a:p>
+                      <a:r>
+                        <a:rPr lang="en-US" dirty="0" err="1"/>
+                        <a:t>mFRR</a:t>
+                      </a:r>
+                      <a:endParaRPr lang="en-US" dirty="0"/>
+                    </a:p>
+                  </a:txBody>
+                  <a:tcPr/>
+                </a:tc>
+                <a:tc>
+                  <a:txBody>
+                    <a:bodyPr/>
+                    <a:lstStyle/>
+                    <a:p>
+                      <a:r>
+                        <a:rPr lang="en-US" dirty="0"/>
+                        <a:t>Special reg</a:t>
+                      </a:r>
+                    </a:p>
+                  </a:txBody>
+                  <a:tcPr/>
+                </a:tc>
+                <a:extLst>
+                  <a:ext uri="{0D108BD9-81ED-4DB2-BD59-A6C34878D82A}">
+                    <a16:rowId xmlns:a16="http://schemas.microsoft.com/office/drawing/2014/main" val="1022968196"/>
+                  </a:ext>
+                </a:extLst>
+              </a:tr>
+              <a:tr h="545999">
+                <a:tc>
+                  <a:txBody>
+                    <a:bodyPr/>
+                    <a:lstStyle/>
+                    <a:p>
+                      <a:r>
+                        <a:rPr lang="en-US" dirty="0"/>
+                        <a:t>Wind turbines</a:t>
+                      </a:r>
+                    </a:p>
+                  </a:txBody>
+                  <a:tcPr/>
+                </a:tc>
+                <a:tc>
+                  <a:txBody>
+                    <a:bodyPr/>
+                    <a:lstStyle/>
+                    <a:p>
+                      <a:pPr algn="r"/>
+                      <a:r>
+                        <a:rPr lang="en-US" dirty="0"/>
+                        <a:t>386</a:t>
+                      </a:r>
+                    </a:p>
+                  </a:txBody>
+                  <a:tcPr/>
+                </a:tc>
+                <a:tc>
+                  <a:txBody>
+                    <a:bodyPr/>
+                    <a:lstStyle/>
+                    <a:p>
+                      <a:pPr algn="r"/>
+                      <a:r>
+                        <a:rPr lang="en-US" dirty="0"/>
+                        <a:t>216</a:t>
+                      </a:r>
+                    </a:p>
+                  </a:txBody>
+                  <a:tcPr/>
+                </a:tc>
+                <a:tc>
+                  <a:txBody>
+                    <a:bodyPr/>
+                    <a:lstStyle/>
+                    <a:p>
+                      <a:pPr algn="r"/>
+                      <a:r>
+                        <a:rPr lang="en-US" dirty="0"/>
+                        <a:t>26</a:t>
+                      </a:r>
+                    </a:p>
+                  </a:txBody>
+                  <a:tcPr/>
+                </a:tc>
+                <a:tc>
+                  <a:txBody>
+                    <a:bodyPr/>
+                    <a:lstStyle/>
+                    <a:p>
+                      <a:pPr algn="r"/>
+                      <a:r>
+                        <a:rPr lang="en-US" dirty="0"/>
+                        <a:t>0</a:t>
+                      </a:r>
+                    </a:p>
+                  </a:txBody>
+                  <a:tcPr/>
+                </a:tc>
+                <a:tc>
+                  <a:txBody>
+                    <a:bodyPr/>
+                    <a:lstStyle/>
+                    <a:p>
+                      <a:pPr algn="r"/>
+                      <a:r>
+                        <a:rPr lang="en-US" dirty="0"/>
+                        <a:t>18</a:t>
+                      </a:r>
+                    </a:p>
+                  </a:txBody>
+                  <a:tcPr/>
+                </a:tc>
+                <a:tc>
+                  <a:txBody>
+                    <a:bodyPr/>
+                    <a:lstStyle/>
+                    <a:p>
+                      <a:pPr algn="r"/>
+                      <a:r>
+                        <a:rPr lang="en-US" dirty="0"/>
+                        <a:t>3</a:t>
+                      </a:r>
+                    </a:p>
+                  </a:txBody>
+                  <a:tcPr/>
+                </a:tc>
+                <a:extLst>
+                  <a:ext uri="{0D108BD9-81ED-4DB2-BD59-A6C34878D82A}">
+                    <a16:rowId xmlns:a16="http://schemas.microsoft.com/office/drawing/2014/main" val="2337509827"/>
+                  </a:ext>
+                </a:extLst>
+              </a:tr>
+              <a:tr h="545999">
+                <a:tc>
+                  <a:txBody>
+                    <a:bodyPr/>
+                    <a:lstStyle/>
+                    <a:p>
+                      <a:r>
+                        <a:rPr lang="en-US" dirty="0"/>
+                        <a:t>Solar PV</a:t>
+                      </a:r>
+                    </a:p>
+                  </a:txBody>
+                  <a:tcPr/>
+                </a:tc>
+                <a:tc>
+                  <a:txBody>
+                    <a:bodyPr/>
+                    <a:lstStyle/>
+                    <a:p>
+                      <a:pPr algn="r"/>
+                      <a:r>
+                        <a:rPr lang="en-US" dirty="0"/>
+                        <a:t>184</a:t>
+                      </a:r>
+                    </a:p>
+                  </a:txBody>
+                  <a:tcPr/>
+                </a:tc>
+                <a:tc>
+                  <a:txBody>
+                    <a:bodyPr/>
+                    <a:lstStyle/>
+                    <a:p>
+                      <a:pPr algn="r"/>
+                      <a:r>
+                        <a:rPr lang="en-US" dirty="0"/>
+                        <a:t>101</a:t>
+                      </a:r>
+                    </a:p>
+                  </a:txBody>
+                  <a:tcPr/>
+                </a:tc>
+                <a:tc>
+                  <a:txBody>
+                    <a:bodyPr/>
+                    <a:lstStyle/>
+                    <a:p>
+                      <a:pPr algn="r"/>
+                      <a:r>
+                        <a:rPr lang="en-US" dirty="0"/>
+                        <a:t>4</a:t>
+                      </a:r>
+                    </a:p>
+                  </a:txBody>
+                  <a:tcPr/>
+                </a:tc>
+                <a:tc>
+                  <a:txBody>
+                    <a:bodyPr/>
+                    <a:lstStyle/>
+                    <a:p>
+                      <a:pPr algn="r"/>
+                      <a:r>
+                        <a:rPr lang="en-US" dirty="0"/>
+                        <a:t>0</a:t>
+                      </a:r>
+                    </a:p>
+                  </a:txBody>
+                  <a:tcPr/>
+                </a:tc>
+                <a:tc>
+                  <a:txBody>
+                    <a:bodyPr/>
+                    <a:lstStyle/>
+                    <a:p>
+                      <a:pPr algn="r"/>
+                      <a:r>
+                        <a:rPr lang="en-US" dirty="0"/>
+                        <a:t>14</a:t>
+                      </a:r>
+                    </a:p>
+                  </a:txBody>
+                  <a:tcPr/>
+                </a:tc>
+                <a:tc>
+                  <a:txBody>
+                    <a:bodyPr/>
+                    <a:lstStyle/>
+                    <a:p>
+                      <a:pPr algn="r"/>
+                      <a:r>
+                        <a:rPr lang="en-US" dirty="0"/>
+                        <a:t>1</a:t>
+                      </a:r>
+                    </a:p>
+                  </a:txBody>
+                  <a:tcPr/>
+                </a:tc>
+                <a:extLst>
+                  <a:ext uri="{0D108BD9-81ED-4DB2-BD59-A6C34878D82A}">
+                    <a16:rowId xmlns:a16="http://schemas.microsoft.com/office/drawing/2014/main" val="1220364233"/>
+                  </a:ext>
+                </a:extLst>
+              </a:tr>
+              <a:tr h="545999">
+                <a:tc>
+                  <a:txBody>
+                    <a:bodyPr/>
+                    <a:lstStyle/>
+                    <a:p>
+                      <a:r>
+                        <a:rPr lang="en-US" dirty="0"/>
+                        <a:t>Electric Boiler</a:t>
+                      </a:r>
+                    </a:p>
+                  </a:txBody>
+                  <a:tcPr/>
+                </a:tc>
+                <a:tc>
+                  <a:txBody>
+                    <a:bodyPr/>
+                    <a:lstStyle/>
+                    <a:p>
+                      <a:pPr algn="r"/>
+                      <a:r>
+                        <a:rPr lang="en-US" dirty="0"/>
+                        <a:t>-424</a:t>
+                      </a:r>
+                    </a:p>
+                  </a:txBody>
+                  <a:tcPr/>
+                </a:tc>
+                <a:tc>
+                  <a:txBody>
+                    <a:bodyPr/>
+                    <a:lstStyle/>
+                    <a:p>
+                      <a:pPr algn="r"/>
+                      <a:r>
+                        <a:rPr lang="en-US" dirty="0"/>
+                        <a:t>381</a:t>
+                      </a:r>
+                    </a:p>
+                  </a:txBody>
+                  <a:tcPr/>
+                </a:tc>
+                <a:tc>
+                  <a:txBody>
+                    <a:bodyPr/>
+                    <a:lstStyle/>
+                    <a:p>
+                      <a:pPr algn="r"/>
+                      <a:r>
+                        <a:rPr lang="en-US" dirty="0"/>
+                        <a:t>140</a:t>
+                      </a:r>
+                    </a:p>
+                  </a:txBody>
+                  <a:tcPr/>
+                </a:tc>
+                <a:tc>
+                  <a:txBody>
+                    <a:bodyPr/>
+                    <a:lstStyle/>
+                    <a:p>
+                      <a:pPr algn="r"/>
+                      <a:r>
+                        <a:rPr lang="en-US" dirty="0"/>
+                        <a:t>0</a:t>
+                      </a:r>
+                    </a:p>
+                  </a:txBody>
+                  <a:tcPr/>
+                </a:tc>
+                <a:tc>
+                  <a:txBody>
+                    <a:bodyPr/>
+                    <a:lstStyle/>
+                    <a:p>
+                      <a:pPr algn="r"/>
+                      <a:r>
+                        <a:rPr lang="en-US" dirty="0"/>
+                        <a:t>50</a:t>
+                      </a:r>
+                    </a:p>
+                  </a:txBody>
+                  <a:tcPr/>
+                </a:tc>
+                <a:tc>
+                  <a:txBody>
+                    <a:bodyPr/>
+                    <a:lstStyle/>
+                    <a:p>
+                      <a:pPr algn="r"/>
+                      <a:r>
+                        <a:rPr lang="en-US" dirty="0"/>
+                        <a:t>0</a:t>
+                      </a:r>
+                    </a:p>
+                  </a:txBody>
+                  <a:tcPr/>
+                </a:tc>
+                <a:extLst>
+                  <a:ext uri="{0D108BD9-81ED-4DB2-BD59-A6C34878D82A}">
+                    <a16:rowId xmlns:a16="http://schemas.microsoft.com/office/drawing/2014/main" val="3385219062"/>
+                  </a:ext>
+                </a:extLst>
+              </a:tr>
+              <a:tr h="545999">
+                <a:tc>
+                  <a:txBody>
+                    <a:bodyPr/>
+                    <a:lstStyle/>
+                    <a:p>
+                      <a:r>
+                        <a:rPr lang="en-US" dirty="0"/>
+                        <a:t>Electrolyzer</a:t>
+                      </a:r>
+                    </a:p>
+                  </a:txBody>
+                  <a:tcPr/>
+                </a:tc>
+                <a:tc>
+                  <a:txBody>
+                    <a:bodyPr/>
+                    <a:lstStyle/>
+                    <a:p>
+                      <a:pPr algn="r"/>
+                      <a:r>
+                        <a:rPr lang="en-US" dirty="0"/>
+                        <a:t>-4.391</a:t>
+                      </a:r>
+                    </a:p>
+                  </a:txBody>
+                  <a:tcPr/>
+                </a:tc>
+                <a:tc>
+                  <a:txBody>
+                    <a:bodyPr/>
+                    <a:lstStyle/>
+                    <a:p>
+                      <a:pPr algn="r"/>
+                      <a:r>
+                        <a:rPr lang="en-US" dirty="0"/>
+                        <a:t>1.779</a:t>
+                      </a:r>
+                    </a:p>
+                  </a:txBody>
+                  <a:tcPr/>
+                </a:tc>
+                <a:tc>
+                  <a:txBody>
+                    <a:bodyPr/>
+                    <a:lstStyle/>
+                    <a:p>
+                      <a:pPr algn="r"/>
+                      <a:r>
+                        <a:rPr lang="en-US" dirty="0"/>
+                        <a:t>38</a:t>
+                      </a:r>
+                    </a:p>
+                  </a:txBody>
+                  <a:tcPr/>
+                </a:tc>
+                <a:tc>
+                  <a:txBody>
+                    <a:bodyPr/>
+                    <a:lstStyle/>
+                    <a:p>
+                      <a:pPr algn="r"/>
+                      <a:r>
+                        <a:rPr lang="en-US" dirty="0"/>
+                        <a:t>0</a:t>
+                      </a:r>
+                    </a:p>
+                  </a:txBody>
+                  <a:tcPr/>
+                </a:tc>
+                <a:tc>
+                  <a:txBody>
+                    <a:bodyPr/>
+                    <a:lstStyle/>
+                    <a:p>
+                      <a:pPr algn="r"/>
+                      <a:r>
+                        <a:rPr lang="en-US" dirty="0"/>
+                        <a:t>53</a:t>
+                      </a:r>
+                    </a:p>
+                  </a:txBody>
+                  <a:tcPr/>
+                </a:tc>
+                <a:tc>
+                  <a:txBody>
+                    <a:bodyPr/>
+                    <a:lstStyle/>
+                    <a:p>
+                      <a:pPr algn="r"/>
+                      <a:r>
+                        <a:rPr lang="en-US" dirty="0"/>
+                        <a:t>15</a:t>
+                      </a:r>
+                    </a:p>
+                  </a:txBody>
+                  <a:tcPr/>
+                </a:tc>
+                <a:extLst>
+                  <a:ext uri="{0D108BD9-81ED-4DB2-BD59-A6C34878D82A}">
+                    <a16:rowId xmlns:a16="http://schemas.microsoft.com/office/drawing/2014/main" val="908160002"/>
+                  </a:ext>
+                </a:extLst>
+              </a:tr>
+              <a:tr h="545999">
+                <a:tc>
+                  <a:txBody>
+                    <a:bodyPr/>
+                    <a:lstStyle/>
+                    <a:p>
+                      <a:r>
+                        <a:rPr lang="en-US" dirty="0"/>
+                        <a:t>Battery</a:t>
+                      </a:r>
+                    </a:p>
+                  </a:txBody>
+                  <a:tcPr/>
+                </a:tc>
+                <a:tc>
+                  <a:txBody>
+                    <a:bodyPr/>
+                    <a:lstStyle/>
+                    <a:p>
+                      <a:pPr algn="r"/>
+                      <a:r>
+                        <a:rPr lang="en-US" dirty="0"/>
+                        <a:t>140</a:t>
+                      </a:r>
+                    </a:p>
+                  </a:txBody>
+                  <a:tcPr/>
+                </a:tc>
+                <a:tc>
+                  <a:txBody>
+                    <a:bodyPr/>
+                    <a:lstStyle/>
+                    <a:p>
+                      <a:pPr algn="r"/>
+                      <a:r>
+                        <a:rPr lang="en-US" dirty="0"/>
+                        <a:t>1.881</a:t>
+                      </a:r>
+                    </a:p>
+                  </a:txBody>
+                  <a:tcPr/>
+                </a:tc>
+                <a:tc>
+                  <a:txBody>
+                    <a:bodyPr/>
+                    <a:lstStyle/>
+                    <a:p>
+                      <a:pPr algn="r"/>
+                      <a:r>
+                        <a:rPr lang="en-US" dirty="0"/>
+                        <a:t>133</a:t>
+                      </a:r>
+                    </a:p>
+                  </a:txBody>
+                  <a:tcPr/>
+                </a:tc>
+                <a:tc>
+                  <a:txBody>
+                    <a:bodyPr/>
+                    <a:lstStyle/>
+                    <a:p>
+                      <a:pPr algn="r"/>
+                      <a:r>
+                        <a:rPr lang="en-US" dirty="0"/>
+                        <a:t>0</a:t>
+                      </a:r>
+                    </a:p>
+                  </a:txBody>
+                  <a:tcPr/>
+                </a:tc>
+                <a:tc>
+                  <a:txBody>
+                    <a:bodyPr/>
+                    <a:lstStyle/>
+                    <a:p>
+                      <a:pPr algn="r"/>
+                      <a:r>
+                        <a:rPr lang="en-US" dirty="0"/>
+                        <a:t>279</a:t>
+                      </a:r>
+                    </a:p>
+                  </a:txBody>
+                  <a:tcPr/>
+                </a:tc>
+                <a:tc>
+                  <a:txBody>
+                    <a:bodyPr/>
+                    <a:lstStyle/>
+                    <a:p>
+                      <a:pPr algn="r"/>
+                      <a:r>
+                        <a:rPr lang="en-US" dirty="0"/>
+                        <a:t>0</a:t>
+                      </a:r>
+                    </a:p>
+                  </a:txBody>
+                  <a:tcPr/>
+                </a:tc>
+                <a:extLst>
+                  <a:ext uri="{0D108BD9-81ED-4DB2-BD59-A6C34878D82A}">
+                    <a16:rowId xmlns:a16="http://schemas.microsoft.com/office/drawing/2014/main" val="4235508766"/>
+                  </a:ext>
+                </a:extLst>
+              </a:tr>
+            </a:tbl>
+          </a:graphicData>
+        </a:graphic>
+      </p:graphicFrame>
+      <p:sp>
+        <p:nvSpPr>
+          <p:cNvPr id="4" name="Date Placeholder 3">
+            <a:extLst>
+              <a:ext uri="{FF2B5EF4-FFF2-40B4-BE49-F238E27FC236}">
+                <a16:creationId xmlns:a16="http://schemas.microsoft.com/office/drawing/2014/main" id="{722BCDE9-9B44-4AB9-B104-00DFA349CB55}"/>
+              </a:ext>
+            </a:extLst>
+          </p:cNvPr>
+          <p:cNvSpPr>
+            <a:spLocks noGrp="1"/>
+          </p:cNvSpPr>
+          <p:nvPr>
+            <p:ph type="dt" sz="half" idx="10"/>
+          </p:nvPr>
+        </p:nvSpPr>
+        <p:spPr/>
+        <p:txBody>
+          <a:bodyPr/>
+          <a:lstStyle/>
+          <a:p>
+            <a:fld id="{6BCE74DF-E3FF-4B6E-9793-4468AD2B28A8}" type="datetime1">
+              <a:rPr lang="da-DK" smtClean="0"/>
+              <a:t>23-04-2020</a:t>
+            </a:fld>
+            <a:r>
+              <a:rPr lang="da-DK"/>
+              <a:t>21-04-2020</a:t>
+            </a:r>
+            <a:endParaRPr lang="da-DK" dirty="0"/>
+          </a:p>
+        </p:txBody>
+      </p:sp>
+    </p:spTree>
+    <p:extLst>
+      <p:ext uri="{BB962C8B-B14F-4D97-AF65-F5344CB8AC3E}">
+        <p14:creationId xmlns:p14="http://schemas.microsoft.com/office/powerpoint/2010/main" val="804278511"/>
+      </p:ext>
+    </p:extLst>
+  </p:cSld>
+  <p:clrMapOvr>
+    <a:masterClrMapping/>
+  </p:clrMapOvr>
+</p:sld>
+</file>
+
+<file path=ppt/slides/slide13.xml><?xml version="1.0" encoding="utf-8"?>
+<p:sld xmlns:a="http://schemas.openxmlformats.org/drawingml/2006/main" xmlns:r="http://schemas.openxmlformats.org/officeDocument/2006/relationships" xmlns:p="http://schemas.openxmlformats.org/presentationml/2006/main">
+  <p:cSld>
+    <p:spTree>
+      <p:nvGrpSpPr>
+        <p:cNvPr id="1" name=""/>
+        <p:cNvGrpSpPr/>
+        <p:nvPr/>
+      </p:nvGrpSpPr>
+      <p:grpSpPr>
+        <a:xfrm>
+          <a:off x="0" y="0"/>
+          <a:ext cx="0" cy="0"/>
+          <a:chOff x="0" y="0"/>
+          <a:chExt cx="0" cy="0"/>
+        </a:xfrm>
+      </p:grpSpPr>
+      <p:sp>
+        <p:nvSpPr>
+          <p:cNvPr id="2" name="Title 1">
+            <a:extLst>
+              <a:ext uri="{FF2B5EF4-FFF2-40B4-BE49-F238E27FC236}">
+                <a16:creationId xmlns:a16="http://schemas.microsoft.com/office/drawing/2014/main" id="{86CD7164-65DF-4998-B1A7-BE9CC85547D9}"/>
+              </a:ext>
+            </a:extLst>
+          </p:cNvPr>
+          <p:cNvSpPr>
+            <a:spLocks noGrp="1"/>
+          </p:cNvSpPr>
+          <p:nvPr>
+            <p:ph type="title"/>
+          </p:nvPr>
+        </p:nvSpPr>
+        <p:spPr/>
+        <p:txBody>
+          <a:bodyPr/>
+          <a:lstStyle/>
+          <a:p>
+            <a:r>
+              <a:rPr lang="en-US" dirty="0"/>
+              <a:t>Results – Portfolio </a:t>
+            </a:r>
+          </a:p>
+        </p:txBody>
+      </p:sp>
+      <p:sp>
+        <p:nvSpPr>
+          <p:cNvPr id="3" name="Content Placeholder 2">
+            <a:extLst>
+              <a:ext uri="{FF2B5EF4-FFF2-40B4-BE49-F238E27FC236}">
+                <a16:creationId xmlns:a16="http://schemas.microsoft.com/office/drawing/2014/main" id="{12875D05-7F65-44EA-B7C4-E70165DB82AC}"/>
+              </a:ext>
+            </a:extLst>
+          </p:cNvPr>
+          <p:cNvSpPr>
+            <a:spLocks noGrp="1"/>
+          </p:cNvSpPr>
+          <p:nvPr>
+            <p:ph idx="1"/>
+          </p:nvPr>
+        </p:nvSpPr>
+        <p:spPr/>
+        <p:txBody>
+          <a:bodyPr/>
+          <a:lstStyle/>
+          <a:p>
+            <a:r>
+              <a:rPr lang="en-US" dirty="0"/>
+              <a:t>In this study a portfolio containing technologies already available to </a:t>
+            </a:r>
+            <a:r>
+              <a:rPr lang="en-US" dirty="0" err="1"/>
+              <a:t>EnergiDanmark</a:t>
+            </a:r>
+            <a:r>
+              <a:rPr lang="en-US" dirty="0"/>
+              <a:t>, has been composed.</a:t>
+            </a:r>
+          </a:p>
+          <a:p>
+            <a:r>
+              <a:rPr lang="en-US" dirty="0"/>
+              <a:t>This study seeks to investigate how this portfolio participates across the power markets</a:t>
+            </a:r>
+          </a:p>
+          <a:p>
+            <a:endParaRPr lang="en-US" dirty="0"/>
+          </a:p>
+        </p:txBody>
+      </p:sp>
+      <p:sp>
+        <p:nvSpPr>
+          <p:cNvPr id="4" name="Date Placeholder 3">
+            <a:extLst>
+              <a:ext uri="{FF2B5EF4-FFF2-40B4-BE49-F238E27FC236}">
+                <a16:creationId xmlns:a16="http://schemas.microsoft.com/office/drawing/2014/main" id="{2143922C-92B9-4982-BA72-E0A0C75A7692}"/>
+              </a:ext>
+            </a:extLst>
+          </p:cNvPr>
+          <p:cNvSpPr>
+            <a:spLocks noGrp="1"/>
+          </p:cNvSpPr>
+          <p:nvPr>
+            <p:ph type="dt" sz="half" idx="10"/>
+          </p:nvPr>
+        </p:nvSpPr>
+        <p:spPr/>
+        <p:txBody>
+          <a:bodyPr/>
+          <a:lstStyle/>
+          <a:p>
+            <a:fld id="{95D1824D-74A3-4C1A-A2A8-3D7440A95C82}" type="datetime1">
+              <a:rPr lang="da-DK" smtClean="0"/>
+              <a:t>23-04-2020</a:t>
+            </a:fld>
+            <a:r>
+              <a:rPr lang="da-DK"/>
+              <a:t>21-04-2020</a:t>
+            </a:r>
+            <a:endParaRPr lang="da-DK" dirty="0"/>
+          </a:p>
+        </p:txBody>
+      </p:sp>
+      <p:graphicFrame>
+        <p:nvGraphicFramePr>
+          <p:cNvPr id="7" name="Table 7">
+            <a:extLst>
+              <a:ext uri="{FF2B5EF4-FFF2-40B4-BE49-F238E27FC236}">
+                <a16:creationId xmlns:a16="http://schemas.microsoft.com/office/drawing/2014/main" id="{DD547B43-5760-4273-A1C9-900F314F6FFB}"/>
+              </a:ext>
+            </a:extLst>
+          </p:cNvPr>
+          <p:cNvGraphicFramePr>
+            <a:graphicFrameLocks noGrp="1"/>
+          </p:cNvGraphicFramePr>
+          <p:nvPr>
+            <p:extLst>
+              <p:ext uri="{D42A27DB-BD31-4B8C-83A1-F6EECF244321}">
+                <p14:modId xmlns:p14="http://schemas.microsoft.com/office/powerpoint/2010/main" val="3745222073"/>
+              </p:ext>
+            </p:extLst>
+          </p:nvPr>
+        </p:nvGraphicFramePr>
+        <p:xfrm>
+          <a:off x="2031470" y="3928821"/>
+          <a:ext cx="8125884" cy="741680"/>
+        </p:xfrm>
+        <a:graphic>
+          <a:graphicData uri="http://schemas.openxmlformats.org/drawingml/2006/table">
+            <a:tbl>
+              <a:tblPr firstRow="1" bandRow="1">
+                <a:tableStyleId>{5C22544A-7EE6-4342-B048-85BDC9FD1C3A}</a:tableStyleId>
+              </a:tblPr>
+              <a:tblGrid>
+                <a:gridCol w="2708628">
+                  <a:extLst>
+                    <a:ext uri="{9D8B030D-6E8A-4147-A177-3AD203B41FA5}">
+                      <a16:colId xmlns:a16="http://schemas.microsoft.com/office/drawing/2014/main" val="552663807"/>
+                    </a:ext>
+                  </a:extLst>
+                </a:gridCol>
+                <a:gridCol w="2708628">
+                  <a:extLst>
+                    <a:ext uri="{9D8B030D-6E8A-4147-A177-3AD203B41FA5}">
+                      <a16:colId xmlns:a16="http://schemas.microsoft.com/office/drawing/2014/main" val="2376363805"/>
+                    </a:ext>
+                  </a:extLst>
+                </a:gridCol>
+                <a:gridCol w="2708628">
+                  <a:extLst>
+                    <a:ext uri="{9D8B030D-6E8A-4147-A177-3AD203B41FA5}">
+                      <a16:colId xmlns:a16="http://schemas.microsoft.com/office/drawing/2014/main" val="256287449"/>
+                    </a:ext>
+                  </a:extLst>
+                </a:gridCol>
+              </a:tblGrid>
+              <a:tr h="370840">
+                <a:tc>
+                  <a:txBody>
+                    <a:bodyPr/>
+                    <a:lstStyle/>
+                    <a:p>
+                      <a:r>
+                        <a:rPr lang="en-US" dirty="0"/>
+                        <a:t>Wind turbines</a:t>
+                      </a:r>
+                    </a:p>
+                  </a:txBody>
+                  <a:tcPr/>
+                </a:tc>
+                <a:tc>
+                  <a:txBody>
+                    <a:bodyPr/>
+                    <a:lstStyle/>
+                    <a:p>
+                      <a:r>
+                        <a:rPr lang="en-US" dirty="0"/>
+                        <a:t>Solar PV</a:t>
+                      </a:r>
+                    </a:p>
+                  </a:txBody>
+                  <a:tcPr/>
+                </a:tc>
+                <a:tc>
+                  <a:txBody>
+                    <a:bodyPr/>
+                    <a:lstStyle/>
+                    <a:p>
+                      <a:r>
+                        <a:rPr lang="en-US" dirty="0"/>
+                        <a:t>Electric Boiler</a:t>
+                      </a:r>
+                    </a:p>
+                  </a:txBody>
+                  <a:tcPr/>
+                </a:tc>
+                <a:extLst>
+                  <a:ext uri="{0D108BD9-81ED-4DB2-BD59-A6C34878D82A}">
+                    <a16:rowId xmlns:a16="http://schemas.microsoft.com/office/drawing/2014/main" val="4261493247"/>
+                  </a:ext>
+                </a:extLst>
+              </a:tr>
+              <a:tr h="370840">
+                <a:tc>
+                  <a:txBody>
+                    <a:bodyPr/>
+                    <a:lstStyle/>
+                    <a:p>
+                      <a:r>
+                        <a:rPr lang="en-US" dirty="0"/>
+                        <a:t>3 MW</a:t>
+                      </a:r>
+                    </a:p>
+                  </a:txBody>
+                  <a:tcPr/>
+                </a:tc>
+                <a:tc>
+                  <a:txBody>
+                    <a:bodyPr/>
+                    <a:lstStyle/>
+                    <a:p>
+                      <a:r>
+                        <a:rPr lang="en-US" dirty="0"/>
+                        <a:t>3 MW</a:t>
+                      </a:r>
+                    </a:p>
+                  </a:txBody>
+                  <a:tcPr/>
+                </a:tc>
+                <a:tc>
+                  <a:txBody>
+                    <a:bodyPr/>
+                    <a:lstStyle/>
+                    <a:p>
+                      <a:r>
+                        <a:rPr lang="en-US" dirty="0"/>
+                        <a:t>1 MW</a:t>
+                      </a:r>
+                    </a:p>
+                  </a:txBody>
+                  <a:tcPr/>
+                </a:tc>
+                <a:extLst>
+                  <a:ext uri="{0D108BD9-81ED-4DB2-BD59-A6C34878D82A}">
+                    <a16:rowId xmlns:a16="http://schemas.microsoft.com/office/drawing/2014/main" val="363174599"/>
+                  </a:ext>
+                </a:extLst>
+              </a:tr>
+            </a:tbl>
+          </a:graphicData>
+        </a:graphic>
+      </p:graphicFrame>
+    </p:spTree>
+    <p:extLst>
+      <p:ext uri="{BB962C8B-B14F-4D97-AF65-F5344CB8AC3E}">
+        <p14:creationId xmlns:p14="http://schemas.microsoft.com/office/powerpoint/2010/main" val="190130341"/>
+      </p:ext>
+    </p:extLst>
+  </p:cSld>
+  <p:clrMapOvr>
+    <a:masterClrMapping/>
+  </p:clrMapOvr>
+</p:sld>
+</file>
+
+<file path=ppt/slides/slide14.xml><?xml version="1.0" encoding="utf-8"?>
+<p:sld xmlns:a="http://schemas.openxmlformats.org/drawingml/2006/main" xmlns:r="http://schemas.openxmlformats.org/officeDocument/2006/relationships" xmlns:p="http://schemas.openxmlformats.org/presentationml/2006/main">
+  <p:cSld>
+    <p:spTree>
+      <p:nvGrpSpPr>
+        <p:cNvPr id="1" name=""/>
+        <p:cNvGrpSpPr/>
+        <p:nvPr/>
+      </p:nvGrpSpPr>
+      <p:grpSpPr>
+        <a:xfrm>
+          <a:off x="0" y="0"/>
+          <a:ext cx="0" cy="0"/>
+          <a:chOff x="0" y="0"/>
+          <a:chExt cx="0" cy="0"/>
+        </a:xfrm>
+      </p:grpSpPr>
+      <p:sp>
+        <p:nvSpPr>
+          <p:cNvPr id="2" name="Title 1">
+            <a:extLst>
+              <a:ext uri="{FF2B5EF4-FFF2-40B4-BE49-F238E27FC236}">
+                <a16:creationId xmlns:a16="http://schemas.microsoft.com/office/drawing/2014/main" id="{04991E93-F2A6-4633-A3F4-A7ECC708E3BC}"/>
+              </a:ext>
+            </a:extLst>
+          </p:cNvPr>
+          <p:cNvSpPr>
+            <a:spLocks noGrp="1"/>
+          </p:cNvSpPr>
+          <p:nvPr>
+            <p:ph type="title"/>
+          </p:nvPr>
+        </p:nvSpPr>
+        <p:spPr/>
+        <p:txBody>
+          <a:bodyPr/>
+          <a:lstStyle/>
+          <a:p>
+            <a:r>
+              <a:rPr lang="en-US" dirty="0"/>
+              <a:t>Results – Portfolio </a:t>
+            </a:r>
+          </a:p>
+        </p:txBody>
+      </p:sp>
+      <p:sp>
+        <p:nvSpPr>
+          <p:cNvPr id="4" name="Date Placeholder 3">
+            <a:extLst>
+              <a:ext uri="{FF2B5EF4-FFF2-40B4-BE49-F238E27FC236}">
+                <a16:creationId xmlns:a16="http://schemas.microsoft.com/office/drawing/2014/main" id="{25F76771-5469-4431-A7DD-16D9995452D1}"/>
+              </a:ext>
+            </a:extLst>
+          </p:cNvPr>
+          <p:cNvSpPr>
+            <a:spLocks noGrp="1"/>
+          </p:cNvSpPr>
+          <p:nvPr>
+            <p:ph type="dt" sz="half" idx="10"/>
+          </p:nvPr>
+        </p:nvSpPr>
+        <p:spPr/>
+        <p:txBody>
+          <a:bodyPr/>
+          <a:lstStyle/>
+          <a:p>
+            <a:fld id="{A02709C9-75E5-41DD-9ADC-D75ACB8E3D0A}" type="datetime1">
+              <a:rPr lang="da-DK" smtClean="0"/>
+              <a:t>23-04-2020</a:t>
+            </a:fld>
+            <a:r>
+              <a:rPr lang="da-DK"/>
+              <a:t>21-04-2020</a:t>
+            </a:r>
+            <a:endParaRPr lang="da-DK" dirty="0"/>
+          </a:p>
+        </p:txBody>
+      </p:sp>
+      <p:graphicFrame>
+        <p:nvGraphicFramePr>
+          <p:cNvPr id="5" name="Table 3">
+            <a:extLst>
+              <a:ext uri="{FF2B5EF4-FFF2-40B4-BE49-F238E27FC236}">
+                <a16:creationId xmlns:a16="http://schemas.microsoft.com/office/drawing/2014/main" id="{B048823D-CB61-449C-9C0E-5A15D25CF9C0}"/>
+              </a:ext>
+            </a:extLst>
+          </p:cNvPr>
+          <p:cNvGraphicFramePr>
+            <a:graphicFrameLocks noGrp="1"/>
+          </p:cNvGraphicFramePr>
+          <p:nvPr>
+            <p:extLst>
+              <p:ext uri="{D42A27DB-BD31-4B8C-83A1-F6EECF244321}">
+                <p14:modId xmlns:p14="http://schemas.microsoft.com/office/powerpoint/2010/main" val="2110871793"/>
+              </p:ext>
+            </p:extLst>
+          </p:nvPr>
+        </p:nvGraphicFramePr>
+        <p:xfrm>
+          <a:off x="307148" y="1988840"/>
+          <a:ext cx="11538250" cy="1575239"/>
+        </p:xfrm>
+        <a:graphic>
+          <a:graphicData uri="http://schemas.openxmlformats.org/drawingml/2006/table">
+            <a:tbl>
+              <a:tblPr firstRow="1" bandRow="1">
+                <a:tableStyleId>{5C22544A-7EE6-4342-B048-85BDC9FD1C3A}</a:tableStyleId>
+              </a:tblPr>
+              <a:tblGrid>
+                <a:gridCol w="2307650">
+                  <a:extLst>
+                    <a:ext uri="{9D8B030D-6E8A-4147-A177-3AD203B41FA5}">
+                      <a16:colId xmlns:a16="http://schemas.microsoft.com/office/drawing/2014/main" val="3113571600"/>
+                    </a:ext>
+                  </a:extLst>
+                </a:gridCol>
+                <a:gridCol w="2307650">
+                  <a:extLst>
+                    <a:ext uri="{9D8B030D-6E8A-4147-A177-3AD203B41FA5}">
+                      <a16:colId xmlns:a16="http://schemas.microsoft.com/office/drawing/2014/main" val="2628223732"/>
+                    </a:ext>
+                  </a:extLst>
+                </a:gridCol>
+                <a:gridCol w="2307650">
+                  <a:extLst>
+                    <a:ext uri="{9D8B030D-6E8A-4147-A177-3AD203B41FA5}">
+                      <a16:colId xmlns:a16="http://schemas.microsoft.com/office/drawing/2014/main" val="1623126789"/>
+                    </a:ext>
+                  </a:extLst>
+                </a:gridCol>
+                <a:gridCol w="2307650">
+                  <a:extLst>
+                    <a:ext uri="{9D8B030D-6E8A-4147-A177-3AD203B41FA5}">
+                      <a16:colId xmlns:a16="http://schemas.microsoft.com/office/drawing/2014/main" val="491043896"/>
+                    </a:ext>
+                  </a:extLst>
+                </a:gridCol>
+                <a:gridCol w="2307650">
+                  <a:extLst>
+                    <a:ext uri="{9D8B030D-6E8A-4147-A177-3AD203B41FA5}">
+                      <a16:colId xmlns:a16="http://schemas.microsoft.com/office/drawing/2014/main" val="3298096351"/>
+                    </a:ext>
+                  </a:extLst>
+                </a:gridCol>
+              </a:tblGrid>
+              <a:tr h="997387">
+                <a:tc>
+                  <a:txBody>
+                    <a:bodyPr/>
+                    <a:lstStyle/>
+                    <a:p>
+                      <a:r>
+                        <a:rPr lang="en-US" dirty="0"/>
+                        <a:t>[1000 DKK/MW/year]</a:t>
+                      </a:r>
+                    </a:p>
+                  </a:txBody>
+                  <a:tcPr/>
+                </a:tc>
+                <a:tc>
+                  <a:txBody>
+                    <a:bodyPr/>
+                    <a:lstStyle/>
+                    <a:p>
+                      <a:r>
+                        <a:rPr lang="en-US" dirty="0"/>
+                        <a:t>Investment</a:t>
+                      </a:r>
+                    </a:p>
+                  </a:txBody>
+                  <a:tcPr/>
+                </a:tc>
+                <a:tc>
+                  <a:txBody>
+                    <a:bodyPr/>
+                    <a:lstStyle/>
+                    <a:p>
+                      <a:r>
+                        <a:rPr lang="en-US" dirty="0"/>
+                        <a:t>Spot market earnings</a:t>
+                      </a:r>
+                    </a:p>
+                  </a:txBody>
+                  <a:tcPr/>
+                </a:tc>
+                <a:tc>
+                  <a:txBody>
+                    <a:bodyPr/>
+                    <a:lstStyle/>
+                    <a:p>
+                      <a:r>
+                        <a:rPr lang="en-US" dirty="0"/>
+                        <a:t>Ancillary services markets earnings </a:t>
+                      </a:r>
+                    </a:p>
+                  </a:txBody>
+                  <a:tcPr/>
+                </a:tc>
+                <a:tc>
+                  <a:txBody>
+                    <a:bodyPr/>
+                    <a:lstStyle/>
+                    <a:p>
+                      <a:r>
+                        <a:rPr lang="en-US" dirty="0"/>
+                        <a:t>Secondary market earnings</a:t>
+                      </a:r>
+                    </a:p>
+                  </a:txBody>
+                  <a:tcPr/>
+                </a:tc>
+                <a:extLst>
+                  <a:ext uri="{0D108BD9-81ED-4DB2-BD59-A6C34878D82A}">
+                    <a16:rowId xmlns:a16="http://schemas.microsoft.com/office/drawing/2014/main" val="3744113494"/>
+                  </a:ext>
+                </a:extLst>
+              </a:tr>
+              <a:tr h="577852">
+                <a:tc>
+                  <a:txBody>
+                    <a:bodyPr/>
+                    <a:lstStyle/>
+                    <a:p>
+                      <a:endParaRPr lang="en-US" dirty="0"/>
+                    </a:p>
+                  </a:txBody>
+                  <a:tcPr/>
+                </a:tc>
+                <a:tc>
+                  <a:txBody>
+                    <a:bodyPr/>
+                    <a:lstStyle/>
+                    <a:p>
+                      <a:pPr algn="r"/>
+                      <a:r>
+                        <a:rPr lang="en-US" dirty="0"/>
+                        <a:t>2.232</a:t>
+                      </a:r>
+                    </a:p>
+                  </a:txBody>
+                  <a:tcPr/>
+                </a:tc>
+                <a:tc>
+                  <a:txBody>
+                    <a:bodyPr/>
+                    <a:lstStyle/>
+                    <a:p>
+                      <a:pPr algn="r"/>
+                      <a:r>
+                        <a:rPr lang="en-US" dirty="0"/>
+                        <a:t>778</a:t>
+                      </a:r>
+                    </a:p>
+                  </a:txBody>
+                  <a:tcPr/>
+                </a:tc>
+                <a:tc>
+                  <a:txBody>
+                    <a:bodyPr/>
+                    <a:lstStyle/>
+                    <a:p>
+                      <a:pPr algn="r"/>
+                      <a:r>
+                        <a:rPr lang="en-US" dirty="0"/>
+                        <a:t>2.108</a:t>
+                      </a:r>
+                    </a:p>
+                  </a:txBody>
+                  <a:tcPr/>
+                </a:tc>
+                <a:tc>
+                  <a:txBody>
+                    <a:bodyPr/>
+                    <a:lstStyle/>
+                    <a:p>
+                      <a:pPr algn="r"/>
+                      <a:r>
+                        <a:rPr lang="en-US" dirty="0"/>
+                        <a:t>719</a:t>
+                      </a:r>
+                    </a:p>
+                  </a:txBody>
+                  <a:tcPr/>
+                </a:tc>
+                <a:extLst>
+                  <a:ext uri="{0D108BD9-81ED-4DB2-BD59-A6C34878D82A}">
+                    <a16:rowId xmlns:a16="http://schemas.microsoft.com/office/drawing/2014/main" val="3291003031"/>
+                  </a:ext>
+                </a:extLst>
+              </a:tr>
+            </a:tbl>
+          </a:graphicData>
+        </a:graphic>
+      </p:graphicFrame>
+      <p:graphicFrame>
+        <p:nvGraphicFramePr>
+          <p:cNvPr id="6" name="Content Placeholder 5">
+            <a:extLst>
+              <a:ext uri="{FF2B5EF4-FFF2-40B4-BE49-F238E27FC236}">
+                <a16:creationId xmlns:a16="http://schemas.microsoft.com/office/drawing/2014/main" id="{1EA35352-6577-4468-813C-D455CBBA58A7}"/>
+              </a:ext>
+            </a:extLst>
+          </p:cNvPr>
+          <p:cNvGraphicFramePr>
+            <a:graphicFrameLocks noGrp="1"/>
+          </p:cNvGraphicFramePr>
+          <p:nvPr>
+            <p:ph idx="1"/>
+            <p:extLst>
+              <p:ext uri="{D42A27DB-BD31-4B8C-83A1-F6EECF244321}">
+                <p14:modId xmlns:p14="http://schemas.microsoft.com/office/powerpoint/2010/main" val="2812299247"/>
+              </p:ext>
+            </p:extLst>
+          </p:nvPr>
+        </p:nvGraphicFramePr>
+        <p:xfrm>
+          <a:off x="315913" y="3933056"/>
+          <a:ext cx="11557000" cy="1488410"/>
+        </p:xfrm>
+        <a:graphic>
+          <a:graphicData uri="http://schemas.openxmlformats.org/drawingml/2006/table">
+            <a:tbl>
+              <a:tblPr firstRow="1" bandRow="1">
+                <a:tableStyleId>{5C22544A-7EE6-4342-B048-85BDC9FD1C3A}</a:tableStyleId>
+              </a:tblPr>
+              <a:tblGrid>
+                <a:gridCol w="1818059">
+                  <a:extLst>
+                    <a:ext uri="{9D8B030D-6E8A-4147-A177-3AD203B41FA5}">
+                      <a16:colId xmlns:a16="http://schemas.microsoft.com/office/drawing/2014/main" val="2725705660"/>
+                    </a:ext>
+                  </a:extLst>
+                </a:gridCol>
+                <a:gridCol w="1483941">
+                  <a:extLst>
+                    <a:ext uri="{9D8B030D-6E8A-4147-A177-3AD203B41FA5}">
+                      <a16:colId xmlns:a16="http://schemas.microsoft.com/office/drawing/2014/main" val="1000752805"/>
+                    </a:ext>
+                  </a:extLst>
+                </a:gridCol>
+                <a:gridCol w="1651000">
+                  <a:extLst>
+                    <a:ext uri="{9D8B030D-6E8A-4147-A177-3AD203B41FA5}">
+                      <a16:colId xmlns:a16="http://schemas.microsoft.com/office/drawing/2014/main" val="3398813878"/>
+                    </a:ext>
+                  </a:extLst>
+                </a:gridCol>
+                <a:gridCol w="1651000">
+                  <a:extLst>
+                    <a:ext uri="{9D8B030D-6E8A-4147-A177-3AD203B41FA5}">
+                      <a16:colId xmlns:a16="http://schemas.microsoft.com/office/drawing/2014/main" val="3494997816"/>
+                    </a:ext>
+                  </a:extLst>
+                </a:gridCol>
+                <a:gridCol w="1651000">
+                  <a:extLst>
+                    <a:ext uri="{9D8B030D-6E8A-4147-A177-3AD203B41FA5}">
+                      <a16:colId xmlns:a16="http://schemas.microsoft.com/office/drawing/2014/main" val="376175037"/>
+                    </a:ext>
+                  </a:extLst>
+                </a:gridCol>
+                <a:gridCol w="1651000">
+                  <a:extLst>
+                    <a:ext uri="{9D8B030D-6E8A-4147-A177-3AD203B41FA5}">
+                      <a16:colId xmlns:a16="http://schemas.microsoft.com/office/drawing/2014/main" val="1234112408"/>
+                    </a:ext>
+                  </a:extLst>
+                </a:gridCol>
+                <a:gridCol w="1651000">
+                  <a:extLst>
+                    <a:ext uri="{9D8B030D-6E8A-4147-A177-3AD203B41FA5}">
+                      <a16:colId xmlns:a16="http://schemas.microsoft.com/office/drawing/2014/main" val="345564488"/>
+                    </a:ext>
+                  </a:extLst>
+                </a:gridCol>
+              </a:tblGrid>
+              <a:tr h="942411">
+                <a:tc>
+                  <a:txBody>
+                    <a:bodyPr/>
+                    <a:lstStyle/>
+                    <a:p>
+                      <a:r>
+                        <a:rPr lang="en-US" dirty="0"/>
+                        <a:t>[1000 DKK/MW/year]</a:t>
+                      </a:r>
+                    </a:p>
+                  </a:txBody>
+                  <a:tcPr/>
+                </a:tc>
+                <a:tc>
+                  <a:txBody>
+                    <a:bodyPr/>
+                    <a:lstStyle/>
+                    <a:p>
+                      <a:r>
+                        <a:rPr lang="en-US" dirty="0"/>
+                        <a:t>Spot</a:t>
+                      </a:r>
+                    </a:p>
+                  </a:txBody>
+                  <a:tcPr/>
+                </a:tc>
+                <a:tc>
+                  <a:txBody>
+                    <a:bodyPr/>
+                    <a:lstStyle/>
+                    <a:p>
+                      <a:r>
+                        <a:rPr lang="en-US" dirty="0"/>
+                        <a:t>FCR up</a:t>
+                      </a:r>
+                    </a:p>
+                  </a:txBody>
+                  <a:tcPr/>
+                </a:tc>
+                <a:tc>
+                  <a:txBody>
+                    <a:bodyPr/>
+                    <a:lstStyle/>
+                    <a:p>
+                      <a:r>
+                        <a:rPr lang="en-US" dirty="0"/>
+                        <a:t>FCR down</a:t>
+                      </a:r>
+                    </a:p>
+                  </a:txBody>
+                  <a:tcPr/>
+                </a:tc>
+                <a:tc>
+                  <a:txBody>
+                    <a:bodyPr/>
+                    <a:lstStyle/>
+                    <a:p>
+                      <a:r>
+                        <a:rPr lang="en-US" dirty="0" err="1"/>
+                        <a:t>aFRR</a:t>
+                      </a:r>
+                      <a:endParaRPr lang="en-US" dirty="0"/>
+                    </a:p>
+                  </a:txBody>
+                  <a:tcPr/>
+                </a:tc>
+                <a:tc>
+                  <a:txBody>
+                    <a:bodyPr/>
+                    <a:lstStyle/>
+                    <a:p>
+                      <a:r>
+                        <a:rPr lang="en-US" dirty="0" err="1"/>
+                        <a:t>mFRR</a:t>
+                      </a:r>
+                      <a:endParaRPr lang="en-US" dirty="0"/>
+                    </a:p>
+                  </a:txBody>
+                  <a:tcPr/>
+                </a:tc>
+                <a:tc>
+                  <a:txBody>
+                    <a:bodyPr/>
+                    <a:lstStyle/>
+                    <a:p>
+                      <a:r>
+                        <a:rPr lang="en-US" dirty="0"/>
+                        <a:t>Special reg</a:t>
+                      </a:r>
+                    </a:p>
+                  </a:txBody>
+                  <a:tcPr/>
+                </a:tc>
+                <a:extLst>
+                  <a:ext uri="{0D108BD9-81ED-4DB2-BD59-A6C34878D82A}">
+                    <a16:rowId xmlns:a16="http://schemas.microsoft.com/office/drawing/2014/main" val="1022968196"/>
+                  </a:ext>
+                </a:extLst>
+              </a:tr>
+              <a:tr h="545999">
+                <a:tc>
+                  <a:txBody>
+                    <a:bodyPr/>
+                    <a:lstStyle/>
+                    <a:p>
+                      <a:endParaRPr lang="en-US" dirty="0"/>
+                    </a:p>
+                  </a:txBody>
+                  <a:tcPr/>
+                </a:tc>
+                <a:tc>
+                  <a:txBody>
+                    <a:bodyPr/>
+                    <a:lstStyle/>
+                    <a:p>
+                      <a:pPr algn="r"/>
+                      <a:r>
+                        <a:rPr lang="en-US" dirty="0"/>
+                        <a:t>778</a:t>
+                      </a:r>
+                    </a:p>
+                  </a:txBody>
+                  <a:tcPr/>
+                </a:tc>
+                <a:tc>
+                  <a:txBody>
+                    <a:bodyPr/>
+                    <a:lstStyle/>
+                    <a:p>
+                      <a:pPr algn="r"/>
+                      <a:r>
+                        <a:rPr lang="en-US" dirty="0"/>
+                        <a:t>1.711</a:t>
+                      </a:r>
+                    </a:p>
+                  </a:txBody>
+                  <a:tcPr/>
+                </a:tc>
+                <a:tc>
+                  <a:txBody>
+                    <a:bodyPr/>
+                    <a:lstStyle/>
+                    <a:p>
+                      <a:pPr algn="r"/>
+                      <a:r>
+                        <a:rPr lang="en-US" dirty="0"/>
+                        <a:t>187</a:t>
+                      </a:r>
+                    </a:p>
+                  </a:txBody>
+                  <a:tcPr/>
+                </a:tc>
+                <a:tc>
+                  <a:txBody>
+                    <a:bodyPr/>
+                    <a:lstStyle/>
+                    <a:p>
+                      <a:pPr algn="r"/>
+                      <a:r>
+                        <a:rPr lang="en-US" dirty="0"/>
+                        <a:t>0</a:t>
+                      </a:r>
+                    </a:p>
+                  </a:txBody>
+                  <a:tcPr/>
+                </a:tc>
+                <a:tc>
+                  <a:txBody>
+                    <a:bodyPr/>
+                    <a:lstStyle/>
+                    <a:p>
+                      <a:pPr algn="r"/>
+                      <a:r>
+                        <a:rPr lang="en-US" dirty="0"/>
+                        <a:t>192</a:t>
+                      </a:r>
+                    </a:p>
+                  </a:txBody>
+                  <a:tcPr/>
+                </a:tc>
+                <a:tc>
+                  <a:txBody>
+                    <a:bodyPr/>
+                    <a:lstStyle/>
+                    <a:p>
+                      <a:pPr algn="r"/>
+                      <a:r>
+                        <a:rPr lang="en-US" dirty="0"/>
+                        <a:t>18</a:t>
+                      </a:r>
+                    </a:p>
+                  </a:txBody>
+                  <a:tcPr/>
+                </a:tc>
+                <a:extLst>
+                  <a:ext uri="{0D108BD9-81ED-4DB2-BD59-A6C34878D82A}">
+                    <a16:rowId xmlns:a16="http://schemas.microsoft.com/office/drawing/2014/main" val="2337509827"/>
+                  </a:ext>
+                </a:extLst>
+              </a:tr>
+            </a:tbl>
+          </a:graphicData>
+        </a:graphic>
+      </p:graphicFrame>
+    </p:spTree>
+    <p:extLst>
+      <p:ext uri="{BB962C8B-B14F-4D97-AF65-F5344CB8AC3E}">
+        <p14:creationId xmlns:p14="http://schemas.microsoft.com/office/powerpoint/2010/main" val="1803322728"/>
+      </p:ext>
+    </p:extLst>
+  </p:cSld>
+  <p:clrMapOvr>
+    <a:masterClrMapping/>
+  </p:clrMapOvr>
+</p:sld>
+</file>
+
+<file path=ppt/slides/slide15.xml><?xml version="1.0" encoding="utf-8"?>
+<p:sld xmlns:a="http://schemas.openxmlformats.org/drawingml/2006/main" xmlns:r="http://schemas.openxmlformats.org/officeDocument/2006/relationships" xmlns:p="http://schemas.openxmlformats.org/presentationml/2006/main">
+  <p:cSld>
+    <p:spTree>
+      <p:nvGrpSpPr>
+        <p:cNvPr id="1" name=""/>
+        <p:cNvGrpSpPr/>
+        <p:nvPr/>
+      </p:nvGrpSpPr>
+      <p:grpSpPr>
+        <a:xfrm>
+          <a:off x="0" y="0"/>
+          <a:ext cx="0" cy="0"/>
+          <a:chOff x="0" y="0"/>
+          <a:chExt cx="0" cy="0"/>
+        </a:xfrm>
+      </p:grpSpPr>
+      <p:sp>
+        <p:nvSpPr>
+          <p:cNvPr id="2" name="Title 1">
+            <a:extLst>
+              <a:ext uri="{FF2B5EF4-FFF2-40B4-BE49-F238E27FC236}">
+                <a16:creationId xmlns:a16="http://schemas.microsoft.com/office/drawing/2014/main" id="{4CC6438C-C873-405F-A2CD-7ED655666350}"/>
+              </a:ext>
+            </a:extLst>
+          </p:cNvPr>
+          <p:cNvSpPr>
+            <a:spLocks noGrp="1"/>
+          </p:cNvSpPr>
+          <p:nvPr>
+            <p:ph type="title"/>
+          </p:nvPr>
+        </p:nvSpPr>
+        <p:spPr/>
+        <p:txBody>
+          <a:bodyPr/>
+          <a:lstStyle/>
+          <a:p>
+            <a:r>
+              <a:rPr lang="en-US" dirty="0"/>
+              <a:t>Further work</a:t>
+            </a:r>
+          </a:p>
+        </p:txBody>
+      </p:sp>
+      <p:sp>
+        <p:nvSpPr>
+          <p:cNvPr id="3" name="Content Placeholder 2">
+            <a:extLst>
+              <a:ext uri="{FF2B5EF4-FFF2-40B4-BE49-F238E27FC236}">
+                <a16:creationId xmlns:a16="http://schemas.microsoft.com/office/drawing/2014/main" id="{7BC95102-1E3F-4FD3-97D7-8B7E88DBD1C6}"/>
+              </a:ext>
+            </a:extLst>
+          </p:cNvPr>
+          <p:cNvSpPr>
+            <a:spLocks noGrp="1"/>
+          </p:cNvSpPr>
+          <p:nvPr>
+            <p:ph idx="1"/>
+          </p:nvPr>
+        </p:nvSpPr>
+        <p:spPr/>
+        <p:txBody>
+          <a:bodyPr/>
+          <a:lstStyle/>
+          <a:p>
+            <a:pPr lvl="1"/>
+            <a:r>
+              <a:rPr lang="en-US" dirty="0"/>
+              <a:t>Include demand response in the model</a:t>
+            </a:r>
+          </a:p>
+          <a:p>
+            <a:pPr lvl="1"/>
+            <a:r>
+              <a:rPr lang="en-US" dirty="0"/>
+              <a:t>Investigate synergies between technologies  </a:t>
+            </a:r>
+          </a:p>
+        </p:txBody>
+      </p:sp>
+      <p:sp>
+        <p:nvSpPr>
+          <p:cNvPr id="4" name="Date Placeholder 3">
+            <a:extLst>
+              <a:ext uri="{FF2B5EF4-FFF2-40B4-BE49-F238E27FC236}">
+                <a16:creationId xmlns:a16="http://schemas.microsoft.com/office/drawing/2014/main" id="{D021E127-90C6-4521-84BC-FDEF64E22DF2}"/>
+              </a:ext>
+            </a:extLst>
+          </p:cNvPr>
+          <p:cNvSpPr>
+            <a:spLocks noGrp="1"/>
+          </p:cNvSpPr>
+          <p:nvPr>
+            <p:ph type="dt" sz="half" idx="10"/>
+          </p:nvPr>
+        </p:nvSpPr>
+        <p:spPr/>
+        <p:txBody>
+          <a:bodyPr/>
+          <a:lstStyle/>
+          <a:p>
+            <a:fld id="{69CE18B0-53E1-4FB4-85A8-72E14D0D4039}" type="datetime1">
+              <a:rPr lang="da-DK" smtClean="0"/>
+              <a:t>23-04-2020</a:t>
+            </a:fld>
+            <a:r>
+              <a:rPr lang="da-DK"/>
+              <a:t>21-04-2020</a:t>
+            </a:r>
+            <a:endParaRPr lang="da-DK" dirty="0"/>
+          </a:p>
+        </p:txBody>
+      </p:sp>
+    </p:spTree>
+    <p:extLst>
+      <p:ext uri="{BB962C8B-B14F-4D97-AF65-F5344CB8AC3E}">
+        <p14:creationId xmlns:p14="http://schemas.microsoft.com/office/powerpoint/2010/main" val="734718179"/>
+      </p:ext>
+    </p:extLst>
+  </p:cSld>
+  <p:clrMapOvr>
+    <a:masterClrMapping/>
+  </p:clrMapOvr>
+</p:sld>
+</file>
+
+<file path=ppt/slides/slide16.xml><?xml version="1.0" encoding="utf-8"?>
+<p:sld xmlns:a="http://schemas.openxmlformats.org/drawingml/2006/main" xmlns:r="http://schemas.openxmlformats.org/officeDocument/2006/relationships" xmlns:p="http://schemas.openxmlformats.org/presentationml/2006/main">
+  <p:cSld>
+    <p:spTree>
+      <p:nvGrpSpPr>
+        <p:cNvPr id="1" name=""/>
+        <p:cNvGrpSpPr/>
+        <p:nvPr/>
+      </p:nvGrpSpPr>
+      <p:grpSpPr>
+        <a:xfrm>
+          <a:off x="0" y="0"/>
+          <a:ext cx="0" cy="0"/>
+          <a:chOff x="0" y="0"/>
+          <a:chExt cx="0" cy="0"/>
+        </a:xfrm>
+      </p:grpSpPr>
+    </p:spTree>
+    <p:custDataLst>
+      <p:tags r:id="rId1"/>
+    </p:custDataLst>
+    <p:extLst>
+      <p:ext uri="{BB962C8B-B14F-4D97-AF65-F5344CB8AC3E}">
+        <p14:creationId xmlns:p14="http://schemas.microsoft.com/office/powerpoint/2010/main" val="2139698179"/>
       </p:ext>
     </p:extLst>
   </p:cSld>
@@ -9419,7 +12009,7 @@
           <a:p>
             <a:r>
               <a:rPr lang="da-DK" dirty="0"/>
-              <a:t>Overblik</a:t>
+              <a:t>overview</a:t>
             </a:r>
           </a:p>
         </p:txBody>
@@ -9446,95 +12036,64 @@
           <a:lstStyle/>
           <a:p>
             <a:r>
-              <a:rPr lang="da-DK" dirty="0"/>
-              <a:t>Formål:</a:t>
-            </a:r>
-          </a:p>
-          <a:p>
-            <a:pPr marL="342900" indent="-342900">
-              <a:buFont typeface="Arial" panose="020B0604020202020204" pitchFamily="34" charset="0"/>
-              <a:buChar char="•"/>
-            </a:pPr>
-            <a:r>
-              <a:rPr lang="da-DK" dirty="0"/>
-              <a:t>Målet med modellen er at vurdere </a:t>
-            </a:r>
-            <a:r>
-              <a:rPr lang="da-DK" u="sng" dirty="0"/>
-              <a:t>hvor meget </a:t>
-            </a:r>
-            <a:r>
-              <a:rPr lang="da-DK" dirty="0"/>
-              <a:t>og </a:t>
-            </a:r>
-            <a:r>
-              <a:rPr lang="da-DK" u="sng" dirty="0"/>
-              <a:t>hvordan</a:t>
-            </a:r>
-            <a:r>
-              <a:rPr lang="da-DK" dirty="0"/>
-              <a:t> en portefølje af teknologier kan skabe værdi i henholdsvis Spot markedet og </a:t>
-            </a:r>
-            <a:r>
-              <a:rPr lang="da-DK" dirty="0" err="1"/>
-              <a:t>mFRR</a:t>
-            </a:r>
-            <a:r>
-              <a:rPr lang="da-DK" dirty="0"/>
-              <a:t> markedet, eller en kombination af de to.</a:t>
-            </a:r>
-          </a:p>
-          <a:p>
-            <a:pPr>
+              <a:rPr lang="en-US" dirty="0"/>
+              <a:t>Purpose:</a:t>
+            </a:r>
+          </a:p>
+          <a:p>
+            <a:pPr lvl="1"/>
+            <a:r>
+              <a:rPr lang="en-US" dirty="0"/>
+              <a:t>The goal of this model is to estimate </a:t>
+            </a:r>
+            <a:r>
+              <a:rPr lang="en-US" u="sng" dirty="0"/>
+              <a:t>how much </a:t>
+            </a:r>
+            <a:r>
+              <a:rPr lang="en-US" dirty="0"/>
+              <a:t>and </a:t>
+            </a:r>
+            <a:r>
+              <a:rPr lang="en-US" u="sng" dirty="0"/>
+              <a:t>how</a:t>
+            </a:r>
+            <a:r>
+              <a:rPr lang="en-US" dirty="0"/>
+              <a:t>, a portfolio of technologies can create value by participating in the spot and ancillary power markets.</a:t>
+            </a:r>
+          </a:p>
+          <a:p>
+            <a:pPr marL="252000" lvl="1" indent="0">
               <a:buNone/>
             </a:pPr>
-            <a:endParaRPr lang="da-DK" dirty="0"/>
-          </a:p>
-          <a:p>
-            <a:pPr>
-              <a:buNone/>
-            </a:pPr>
-            <a:r>
-              <a:rPr lang="da-DK" dirty="0"/>
-              <a:t>Udførelse:</a:t>
-            </a:r>
-          </a:p>
-          <a:p>
-            <a:pPr marL="342900" indent="-342900">
-              <a:buFont typeface="Arial" panose="020B0604020202020204" pitchFamily="34" charset="0"/>
-              <a:buChar char="•"/>
-            </a:pPr>
-            <a:r>
-              <a:rPr lang="da-DK" dirty="0"/>
-              <a:t>Der er udviklet en numerisk optimerings model, der kan investere i en portefølje af teknologier og deltage i spot og </a:t>
-            </a:r>
-            <a:r>
-              <a:rPr lang="da-DK" dirty="0" err="1"/>
-              <a:t>mFRR</a:t>
-            </a:r>
-            <a:r>
-              <a:rPr lang="da-DK" dirty="0"/>
-              <a:t> markedet. </a:t>
-            </a:r>
-          </a:p>
-          <a:p>
-            <a:pPr marL="342900" indent="-342900">
-              <a:buFont typeface="Arial" panose="020B0604020202020204" pitchFamily="34" charset="0"/>
-              <a:buChar char="•"/>
-            </a:pPr>
-            <a:r>
-              <a:rPr lang="da-DK" dirty="0"/>
-              <a:t>Modellen optimere porteføljen og driften således at profitten er maksimeret. </a:t>
-            </a:r>
-          </a:p>
-          <a:p>
-            <a:pPr marL="342900" indent="-342900">
-              <a:buFont typeface="Arial" panose="020B0604020202020204" pitchFamily="34" charset="0"/>
-              <a:buChar char="•"/>
-            </a:pPr>
-            <a:r>
-              <a:rPr lang="da-DK" dirty="0"/>
-              <a:t>Historisk markeds, vind og sol data er brugt.</a:t>
+            <a:endParaRPr lang="en-US" dirty="0"/>
+          </a:p>
+          <a:p>
+            <a:r>
+              <a:rPr lang="en-US" dirty="0"/>
+              <a:t>Execution:</a:t>
+            </a:r>
+          </a:p>
+          <a:p>
+            <a:pPr lvl="1"/>
+            <a:r>
+              <a:rPr lang="en-US" dirty="0"/>
+              <a:t>A numerical model has been developed, capable of investing in a portfolio of technologies</a:t>
+            </a:r>
+          </a:p>
+          <a:p>
+            <a:pPr lvl="1"/>
+            <a:r>
+              <a:rPr lang="en-US" dirty="0"/>
+              <a:t>The model configures the portfolio such that profit is maximized</a:t>
+            </a:r>
+          </a:p>
+          <a:p>
+            <a:pPr lvl="1"/>
+            <a:r>
+              <a:rPr lang="en-US" dirty="0"/>
+              <a:t>Historical market data is used</a:t>
             </a:r>
           </a:p>
         </p:txBody>
@@ -9562,7 +12121,7 @@
           <a:p>
             <a:fld id="{389A2BD4-08C2-4DBB-BDC6-B0E7CB52BA1C}" type="datetime1">
               <a:rPr lang="da-DK" smtClean="0"/>
-              <a:t>21-04-2020</a:t>
+              <a:t>23-04-2020</a:t>
             </a:fld>
             <a:r>
               <a:rPr lang="da-DK"/>
@@ -9582,178 +12141,6 @@
   <p:clrMapOvr>
     <a:masterClrMapping/>
   </p:clrMapOvr>
-  <p:timing>
-    <p:tnLst>
-      <p:par>
-        <p:cTn id="1" dur="indefinite" restart="never" nodeType="tmRoot">
-          <p:childTnLst>
-            <p:seq concurrent="1" nextAc="seek">
-              <p:cTn id="2" dur="indefinite" nodeType="mainSeq">
-                <p:childTnLst>
-                  <p:par>
-                    <p:cTn id="3" fill="hold">
-                      <p:stCondLst>
-                        <p:cond delay="indefinite"/>
-                      </p:stCondLst>
-                      <p:childTnLst>
-                        <p:par>
-                          <p:cTn id="4" fill="hold">
-                            <p:stCondLst>
-                              <p:cond delay="0"/>
-                            </p:stCondLst>
-                            <p:childTnLst>
-                              <p:par>
-                                <p:cTn id="5" presetID="1" presetClass="entr" presetSubtype="0" fill="hold" nodeType="clickEffect">
-                                  <p:stCondLst>
-                                    <p:cond delay="0"/>
-                                  </p:stCondLst>
-                                  <p:childTnLst>
-                                    <p:set>
-                                      <p:cBhvr>
-                                        <p:cTn id="6" dur="1" fill="hold">
-                                          <p:stCondLst>
-                                            <p:cond delay="0"/>
-                                          </p:stCondLst>
-                                        </p:cTn>
-                                        <p:tgtEl>
-                                          <p:spTgt spid="3">
-                                            <p:txEl>
-                                              <p:pRg st="3" end="3"/>
-                                            </p:txEl>
-                                          </p:spTgt>
-                                        </p:tgtEl>
-                                        <p:attrNameLst>
-                                          <p:attrName>style.visibility</p:attrName>
-                                        </p:attrNameLst>
-                                      </p:cBhvr>
-                                      <p:to>
-                                        <p:strVal val="visible"/>
-                                      </p:to>
-                                    </p:set>
-                                  </p:childTnLst>
-                                </p:cTn>
-                              </p:par>
-                              <p:par>
-                                <p:cTn id="7" presetID="1" presetClass="entr" presetSubtype="0" fill="hold" nodeType="withEffect">
-                                  <p:stCondLst>
-                                    <p:cond delay="0"/>
-                                  </p:stCondLst>
-                                  <p:childTnLst>
-                                    <p:set>
-                                      <p:cBhvr>
-                                        <p:cTn id="8" dur="1" fill="hold">
-                                          <p:stCondLst>
-                                            <p:cond delay="0"/>
-                                          </p:stCondLst>
-                                        </p:cTn>
-                                        <p:tgtEl>
-                                          <p:spTgt spid="3">
-                                            <p:txEl>
-                                              <p:pRg st="4" end="4"/>
-                                            </p:txEl>
-                                          </p:spTgt>
-                                        </p:tgtEl>
-                                        <p:attrNameLst>
-                                          <p:attrName>style.visibility</p:attrName>
-                                        </p:attrNameLst>
-                                      </p:cBhvr>
-                                      <p:to>
-                                        <p:strVal val="visible"/>
-                                      </p:to>
-                                    </p:set>
-                                  </p:childTnLst>
-                                </p:cTn>
-                              </p:par>
-                              <p:par>
-                                <p:cTn id="9" presetID="1" presetClass="entr" presetSubtype="0" fill="hold" nodeType="withEffect">
-                                  <p:stCondLst>
-                                    <p:cond delay="0"/>
-                                  </p:stCondLst>
-                                  <p:childTnLst>
-                                    <p:set>
-                                      <p:cBhvr>
-                                        <p:cTn id="10" dur="1" fill="hold">
-                                          <p:stCondLst>
-                                            <p:cond delay="0"/>
-                                          </p:stCondLst>
-                                        </p:cTn>
-                                        <p:tgtEl>
-                                          <p:spTgt spid="3">
-                                            <p:txEl>
-                                              <p:pRg st="5" end="5"/>
-                                            </p:txEl>
-                                          </p:spTgt>
-                                        </p:tgtEl>
-                                        <p:attrNameLst>
-                                          <p:attrName>style.visibility</p:attrName>
-                                        </p:attrNameLst>
-                                      </p:cBhvr>
-                                      <p:to>
-                                        <p:strVal val="visible"/>
-                                      </p:to>
-                                    </p:set>
-                                  </p:childTnLst>
-                                </p:cTn>
-                              </p:par>
-                              <p:par>
-                                <p:cTn id="11" presetID="1" presetClass="entr" presetSubtype="0" fill="hold" nodeType="withEffect">
-                                  <p:stCondLst>
-                                    <p:cond delay="0"/>
-                                  </p:stCondLst>
-                                  <p:childTnLst>
-                                    <p:set>
-                                      <p:cBhvr>
-                                        <p:cTn id="12" dur="1" fill="hold">
-                                          <p:stCondLst>
-                                            <p:cond delay="0"/>
-                                          </p:stCondLst>
-                                        </p:cTn>
-                                        <p:tgtEl>
-                                          <p:spTgt spid="3">
-                                            <p:txEl>
-                                              <p:pRg st="6" end="6"/>
-                                            </p:txEl>
-                                          </p:spTgt>
-                                        </p:tgtEl>
-                                        <p:attrNameLst>
-                                          <p:attrName>style.visibility</p:attrName>
-                                        </p:attrNameLst>
-                                      </p:cBhvr>
-                                      <p:to>
-                                        <p:strVal val="visible"/>
-                                      </p:to>
-                                    </p:set>
-                                  </p:childTnLst>
-                                </p:cTn>
-                              </p:par>
-                            </p:childTnLst>
-                          </p:cTn>
-                        </p:par>
-                      </p:childTnLst>
-                    </p:cTn>
-                  </p:par>
-                </p:childTnLst>
-              </p:cTn>
-              <p:prevCondLst>
-                <p:cond evt="onPrev" delay="0">
-                  <p:tgtEl>
-                    <p:sldTgt/>
-                  </p:tgtEl>
-                </p:cond>
-              </p:prevCondLst>
-              <p:nextCondLst>
-                <p:cond evt="onNext" delay="0">
-                  <p:tgtEl>
-                    <p:sldTgt/>
-                  </p:tgtEl>
-                </p:cond>
-              </p:nextCondLst>
-            </p:seq>
-          </p:childTnLst>
-        </p:cTn>
-      </p:par>
-    </p:tnLst>
-  </p:timing>
 </p:sld>
 </file>
 
@@ -9790,8 +12177,8 @@
           <a:lstStyle/>
           <a:p>
             <a:r>
-              <a:rPr lang="da-DK" dirty="0"/>
-              <a:t>Overblik</a:t>
+              <a:rPr lang="en-US" dirty="0"/>
+              <a:t>Overview</a:t>
             </a:r>
           </a:p>
         </p:txBody>
@@ -10477,7 +12864,7 @@
               <a:rPr lang="da-DK" sz="1600" dirty="0">
                 <a:latin typeface="+mn-lt"/>
               </a:rPr>
-              <a:t>Tarif 194 [DKK/MWh]</a:t>
+              <a:t>Tarif 394 [DKK/MWh]</a:t>
             </a:r>
           </a:p>
         </p:txBody>
@@ -11974,12 +14361,48 @@
           <a:chExt cx="0" cy="0"/>
         </a:xfrm>
       </p:grpSpPr>
+      <p:pic>
+        <p:nvPicPr>
+          <p:cNvPr id="10" name="Picture 9" descr="A close up of a map&#10;&#10;Description automatically generated">
+            <a:extLst>
+              <a:ext uri="{FF2B5EF4-FFF2-40B4-BE49-F238E27FC236}">
+                <a16:creationId xmlns:a16="http://schemas.microsoft.com/office/drawing/2014/main" id="{6D93209F-45A1-4B18-9663-F952D32BA80B}"/>
+              </a:ext>
+            </a:extLst>
+          </p:cNvPr>
+          <p:cNvPicPr>
+            <a:picLocks noChangeAspect="1"/>
+          </p:cNvPicPr>
+          <p:nvPr/>
+        </p:nvPicPr>
+        <p:blipFill>
+          <a:blip r:embed="rId2">
+            <a:extLst>
+              <a:ext uri="{28A0092B-C50C-407E-A947-70E740481C1C}">
+                <a14:useLocalDpi xmlns:a14="http://schemas.microsoft.com/office/drawing/2010/main" val="0"/>
+              </a:ext>
+            </a:extLst>
+          </a:blip>
+          <a:stretch>
+            <a:fillRect/>
+          </a:stretch>
+        </p:blipFill>
+        <p:spPr>
+          <a:xfrm>
+            <a:off x="7429880" y="2847191"/>
+            <a:ext cx="4758945" cy="3059322"/>
+          </a:xfrm>
+          <a:prstGeom prst="rect">
+            <a:avLst/>
+          </a:prstGeom>
+        </p:spPr>
+      </p:pic>
       <p:sp>
         <p:nvSpPr>
           <p:cNvPr id="2" name="Title 1">
             <a:extLst>
               <a:ext uri="{FF2B5EF4-FFF2-40B4-BE49-F238E27FC236}">
-                <a16:creationId xmlns:a16="http://schemas.microsoft.com/office/drawing/2014/main" id="{DA7D789D-B982-422B-ABBF-BE69A4DBA9E9}"/>
+                <a16:creationId xmlns:a16="http://schemas.microsoft.com/office/drawing/2014/main" id="{C819B4D2-4AAA-419A-BDB1-DBC1FEA59E17}"/>
               </a:ext>
             </a:extLst>
           </p:cNvPr>
@@ -11996,8 +14419,8 @@
           <a:lstStyle/>
           <a:p>
             <a:r>
-              <a:rPr lang="da-DK"/>
-              <a:t>OVerblik</a:t>
+              <a:rPr lang="en-US" dirty="0"/>
+              <a:t>Spot market</a:t>
             </a:r>
           </a:p>
         </p:txBody>
@@ -12007,7 +14430,7 @@
           <p:cNvPr id="3" name="Content Placeholder 2">
             <a:extLst>
               <a:ext uri="{FF2B5EF4-FFF2-40B4-BE49-F238E27FC236}">
-                <a16:creationId xmlns:a16="http://schemas.microsoft.com/office/drawing/2014/main" id="{B3187B9F-8967-4AC6-9656-5350E97549DE}"/>
+                <a16:creationId xmlns:a16="http://schemas.microsoft.com/office/drawing/2014/main" id="{08453E2A-E9F1-456B-8FC6-E1CD33731690}"/>
               </a:ext>
             </a:extLst>
           </p:cNvPr>
@@ -12018,69 +14441,37 @@
             <p:ph idx="1"/>
           </p:nvPr>
         </p:nvSpPr>
-        <p:spPr/>
+        <p:spPr>
+          <a:xfrm>
+            <a:off x="985839" y="1960079"/>
+            <a:ext cx="5108574" cy="3937484"/>
+          </a:xfrm>
+        </p:spPr>
         <p:txBody>
           <a:bodyPr/>
           <a:lstStyle/>
           <a:p>
             <a:r>
-              <a:rPr lang="da-DK" dirty="0"/>
-              <a:t>Kun DK1</a:t>
-            </a:r>
-          </a:p>
-          <a:p>
-            <a:r>
-              <a:rPr lang="da-DK" dirty="0"/>
-              <a:t>Markeder inkluderet: </a:t>
-            </a:r>
-          </a:p>
-          <a:p>
-            <a:pPr lvl="1"/>
-            <a:r>
-              <a:rPr lang="da-DK" dirty="0"/>
-              <a:t>Spot, </a:t>
-            </a:r>
-            <a:r>
-              <a:rPr lang="da-DK" dirty="0" err="1"/>
-              <a:t>mFRR</a:t>
-            </a:r>
-            <a:r>
-              <a:rPr lang="da-DK" dirty="0"/>
-              <a:t>, </a:t>
-            </a:r>
-            <a:r>
-              <a:rPr lang="da-DK" dirty="0" err="1"/>
-              <a:t>aFRR</a:t>
-            </a:r>
-            <a:r>
-              <a:rPr lang="da-DK" dirty="0"/>
-              <a:t>, FCR og special nedregulering </a:t>
-            </a:r>
-          </a:p>
-          <a:p>
-            <a:r>
-              <a:rPr lang="da-DK" dirty="0"/>
-              <a:t>Teknologier inkluderet:</a:t>
-            </a:r>
-          </a:p>
-          <a:p>
-            <a:pPr lvl="1"/>
-            <a:r>
-              <a:rPr lang="da-DK" dirty="0"/>
-              <a:t>Vind, Sol, Elkedel, Elektrolyse, Batteri</a:t>
-            </a:r>
-          </a:p>
-          <a:p>
-            <a:r>
-              <a:rPr lang="da-DK" dirty="0"/>
-              <a:t>Teknologier ikke inkluderet:</a:t>
-            </a:r>
-          </a:p>
-          <a:p>
-            <a:pPr lvl="1"/>
-            <a:r>
-              <a:rPr lang="da-DK" dirty="0"/>
-              <a:t>Fleksibel forbrug </a:t>
+              <a:rPr lang="en-US" sz="1600" dirty="0"/>
+              <a:t>The spot market is where the majority of electric power is sold. The market closes at 12:00 the day before the hour of delivery. </a:t>
+            </a:r>
+          </a:p>
+          <a:p>
+            <a:r>
+              <a:rPr lang="en-US" sz="1600" dirty="0"/>
+              <a:t>The average spot price is around 200 DKK/MWh but fluctuating between -200 DKK/MWh and 800 DKK/MWh</a:t>
+            </a:r>
+          </a:p>
+          <a:p>
+            <a:r>
+              <a:rPr lang="en-US" sz="1600" dirty="0"/>
+              <a:t>When selling energy the spot market a TSO tariff of 4 DKK/MWh is paid.</a:t>
+            </a:r>
+          </a:p>
+          <a:p>
+            <a:r>
+              <a:rPr lang="en-US" sz="1600" dirty="0"/>
+              <a:t>When purchasing energy from the spot market a TSO tariff of 94 DKK/MWH is paid + a DSO tariff of 300 DKK/MWH. DSO tariff varies depending on the used DSO. </a:t>
             </a:r>
           </a:p>
         </p:txBody>
@@ -12090,7 +14481,7 @@
           <p:cNvPr id="4" name="Date Placeholder 3">
             <a:extLst>
               <a:ext uri="{FF2B5EF4-FFF2-40B4-BE49-F238E27FC236}">
-                <a16:creationId xmlns:a16="http://schemas.microsoft.com/office/drawing/2014/main" id="{D1D77B59-6CE6-4790-AFDA-00AF2FDE6632}"/>
+                <a16:creationId xmlns:a16="http://schemas.microsoft.com/office/drawing/2014/main" id="{45808A0A-E82D-44E9-A362-BE8768B69ACD}"/>
               </a:ext>
             </a:extLst>
           </p:cNvPr>
@@ -12106,9 +14497,9 @@
           <a:bodyPr/>
           <a:lstStyle/>
           <a:p>
-            <a:fld id="{35D0CEA2-3C11-44C1-9773-3FF364CB93BA}" type="datetime1">
+            <a:fld id="{AA95DF64-EE7B-4E28-AF74-2315A9261C20}" type="datetime1">
               <a:rPr lang="da-DK" smtClean="0"/>
-              <a:t>20-04-2020</a:t>
+              <a:t>23-04-2020</a:t>
             </a:fld>
             <a:r>
               <a:rPr lang="da-DK"/>
@@ -12118,10 +14509,46 @@
           </a:p>
         </p:txBody>
       </p:sp>
+      <p:pic>
+        <p:nvPicPr>
+          <p:cNvPr id="8" name="Picture 7" descr="A screenshot of a cell phone&#10;&#10;Description automatically generated">
+            <a:extLst>
+              <a:ext uri="{FF2B5EF4-FFF2-40B4-BE49-F238E27FC236}">
+                <a16:creationId xmlns:a16="http://schemas.microsoft.com/office/drawing/2014/main" id="{2881D9B4-6BC6-4FD8-9737-AC0308A183DD}"/>
+              </a:ext>
+            </a:extLst>
+          </p:cNvPr>
+          <p:cNvPicPr>
+            <a:picLocks noChangeAspect="1"/>
+          </p:cNvPicPr>
+          <p:nvPr/>
+        </p:nvPicPr>
+        <p:blipFill>
+          <a:blip r:embed="rId3">
+            <a:extLst>
+              <a:ext uri="{28A0092B-C50C-407E-A947-70E740481C1C}">
+                <a14:useLocalDpi xmlns:a14="http://schemas.microsoft.com/office/drawing/2010/main" val="0"/>
+              </a:ext>
+            </a:extLst>
+          </a:blip>
+          <a:stretch>
+            <a:fillRect/>
+          </a:stretch>
+        </p:blipFill>
+        <p:spPr>
+          <a:xfrm>
+            <a:off x="7429879" y="236988"/>
+            <a:ext cx="4758945" cy="3059322"/>
+          </a:xfrm>
+          <a:prstGeom prst="rect">
+            <a:avLst/>
+          </a:prstGeom>
+        </p:spPr>
+      </p:pic>
     </p:spTree>
     <p:extLst>
       <p:ext uri="{BB962C8B-B14F-4D97-AF65-F5344CB8AC3E}">
-        <p14:creationId xmlns:p14="http://schemas.microsoft.com/office/powerpoint/2010/main" val="3715357319"/>
+        <p14:creationId xmlns:p14="http://schemas.microsoft.com/office/powerpoint/2010/main" val="2035712635"/>
       </p:ext>
     </p:extLst>
   </p:cSld>
@@ -12153,7 +14580,7 @@
           <p:cNvPr id="2" name="Title 1">
             <a:extLst>
               <a:ext uri="{FF2B5EF4-FFF2-40B4-BE49-F238E27FC236}">
-                <a16:creationId xmlns:a16="http://schemas.microsoft.com/office/drawing/2014/main" id="{D9E1E635-0156-46E2-B986-02DD8B123B5B}"/>
+                <a16:creationId xmlns:a16="http://schemas.microsoft.com/office/drawing/2014/main" id="{0B62AFA4-04A8-4A87-AC7A-C0D645F28B15}"/>
               </a:ext>
             </a:extLst>
           </p:cNvPr>
@@ -12164,29 +14591,33 @@
             <p:ph type="title"/>
           </p:nvPr>
         </p:nvSpPr>
-        <p:spPr>
-          <a:xfrm>
-            <a:off x="316800" y="230400"/>
-            <a:ext cx="10890180" cy="752400"/>
-          </a:xfrm>
-        </p:spPr>
+        <p:spPr/>
         <p:txBody>
           <a:bodyPr/>
           <a:lstStyle/>
           <a:p>
             <a:r>
+              <a:rPr lang="da-DK" dirty="0" err="1"/>
+              <a:t>Fcr</a:t>
+            </a:r>
+            <a:r>
               <a:rPr lang="da-DK" dirty="0"/>
-              <a:t>Resultater – Alle markeder</a:t>
-            </a:r>
-          </a:p>
-        </p:txBody>
-      </p:sp>
-      <p:sp>
-        <p:nvSpPr>
-          <p:cNvPr id="5" name="Date Placeholder 4">
+              <a:t> </a:t>
+            </a:r>
+            <a:r>
+              <a:rPr lang="da-DK" dirty="0" err="1"/>
+              <a:t>market</a:t>
+            </a:r>
+            <a:endParaRPr lang="da-DK" dirty="0"/>
+          </a:p>
+        </p:txBody>
+      </p:sp>
+      <p:sp>
+        <p:nvSpPr>
+          <p:cNvPr id="3" name="Content Placeholder 2">
             <a:extLst>
               <a:ext uri="{FF2B5EF4-FFF2-40B4-BE49-F238E27FC236}">
-                <a16:creationId xmlns:a16="http://schemas.microsoft.com/office/drawing/2014/main" id="{D6AAE5E1-4836-4FA6-829E-DCA29C874AC9}"/>
+                <a16:creationId xmlns:a16="http://schemas.microsoft.com/office/drawing/2014/main" id="{0566E0E9-308D-4B22-95BB-12C31F0D482F}"/>
               </a:ext>
             </a:extLst>
           </p:cNvPr>
@@ -12194,17 +14625,90 @@
             <a:spLocks noGrp="1"/>
           </p:cNvSpPr>
           <p:nvPr>
-            <p:ph type="dt" sz="half" idx="15"/>
+            <p:ph idx="1"/>
           </p:nvPr>
         </p:nvSpPr>
-        <p:spPr/>
+        <p:spPr>
+          <a:xfrm>
+            <a:off x="985839" y="1960079"/>
+            <a:ext cx="5108574" cy="3937484"/>
+          </a:xfrm>
+        </p:spPr>
         <p:txBody>
           <a:bodyPr/>
           <a:lstStyle/>
           <a:p>
-            <a:fld id="{63A1E821-CAB7-41B7-921A-53EE81194D27}" type="datetime1">
+            <a:r>
+              <a:rPr lang="en-US" sz="1600" dirty="0"/>
+              <a:t>The FCR (frequency containment reserve), also know as primary reserve, is the fastest ancillary service purchased by </a:t>
+            </a:r>
+            <a:r>
+              <a:rPr lang="en-US" sz="1600" dirty="0" err="1"/>
+              <a:t>EnergiNet</a:t>
+            </a:r>
+            <a:r>
+              <a:rPr lang="en-US" sz="1600" dirty="0"/>
+              <a:t>.  This service is responsible for keeping the net frequency between 50.1-49.9 Hz. </a:t>
+            </a:r>
+          </a:p>
+          <a:p>
+            <a:r>
+              <a:rPr lang="en-US" sz="1600" dirty="0"/>
+              <a:t>Units providing FCR has to deliver regulation within 15sec, and must be capable of staying active for 15 min, until </a:t>
+            </a:r>
+            <a:r>
+              <a:rPr lang="en-US" sz="1600" dirty="0" err="1"/>
+              <a:t>aFRR</a:t>
+            </a:r>
+            <a:r>
+              <a:rPr lang="en-US" sz="1600" dirty="0"/>
+              <a:t> takes over </a:t>
+            </a:r>
+          </a:p>
+          <a:p>
+            <a:r>
+              <a:rPr lang="en-US" sz="1600" dirty="0"/>
+              <a:t>In DK1 FCR is purchased separately for Up and Down regulation. In DK2 it is a symmetric product. </a:t>
+            </a:r>
+          </a:p>
+          <a:p>
+            <a:r>
+              <a:rPr lang="en-US" sz="1600" dirty="0"/>
+              <a:t>There is a requirement on minimum 4 hours of commitment with the same capacity</a:t>
+            </a:r>
+          </a:p>
+          <a:p>
+            <a:r>
+              <a:rPr lang="en-US" sz="1600" dirty="0"/>
+              <a:t>In DK1 a total of 20MW up and down regulation capacity is purchased in the majority of hours </a:t>
+            </a:r>
+          </a:p>
+        </p:txBody>
+      </p:sp>
+      <p:sp>
+        <p:nvSpPr>
+          <p:cNvPr id="4" name="Date Placeholder 3">
+            <a:extLst>
+              <a:ext uri="{FF2B5EF4-FFF2-40B4-BE49-F238E27FC236}">
+                <a16:creationId xmlns:a16="http://schemas.microsoft.com/office/drawing/2014/main" id="{4D71C2C9-C776-4E45-80FE-48C1AF6625B5}"/>
+              </a:ext>
+            </a:extLst>
+          </p:cNvPr>
+          <p:cNvSpPr>
+            <a:spLocks noGrp="1"/>
+          </p:cNvSpPr>
+          <p:nvPr>
+            <p:ph type="dt" sz="half" idx="10"/>
+          </p:nvPr>
+        </p:nvSpPr>
+        <p:spPr/>
+        <p:txBody>
+          <a:bodyPr/>
+          <a:lstStyle/>
+          <a:p>
+            <a:fld id="{B66A88EC-4B0F-4FC9-B799-E9CF761913E9}" type="datetime1">
               <a:rPr lang="da-DK" smtClean="0"/>
-              <a:t>20-04-2020</a:t>
+              <a:t>23-04-2020</a:t>
             </a:fld>
             <a:r>
               <a:rPr lang="da-DK"/>
@@ -12216,10 +14720,10 @@
       </p:sp>
       <p:pic>
         <p:nvPicPr>
-          <p:cNvPr id="8" name="Picture 7">
+          <p:cNvPr id="6" name="Picture 5" descr="A screenshot of a cell phone&#10;&#10;Description automatically generated">
             <a:extLst>
               <a:ext uri="{FF2B5EF4-FFF2-40B4-BE49-F238E27FC236}">
-                <a16:creationId xmlns:a16="http://schemas.microsoft.com/office/drawing/2014/main" id="{5A064B31-DAF1-4A25-A6A6-C797C99B8C5A}"/>
+                <a16:creationId xmlns:a16="http://schemas.microsoft.com/office/drawing/2014/main" id="{1E823E10-2BAD-4D20-B52C-E1F18EEECEF9}"/>
               </a:ext>
             </a:extLst>
           </p:cNvPr>
@@ -12229,15 +14733,21 @@
           <p:nvPr/>
         </p:nvPicPr>
         <p:blipFill>
-          <a:blip r:embed="rId2"/>
+          <a:blip r:embed="rId2">
+            <a:extLst>
+              <a:ext uri="{28A0092B-C50C-407E-A947-70E740481C1C}">
+                <a14:useLocalDpi xmlns:a14="http://schemas.microsoft.com/office/drawing/2010/main" val="0"/>
+              </a:ext>
+            </a:extLst>
+          </a:blip>
           <a:stretch>
             <a:fillRect/>
           </a:stretch>
         </p:blipFill>
         <p:spPr>
           <a:xfrm>
-            <a:off x="7462564" y="2438400"/>
-            <a:ext cx="3228975" cy="1981200"/>
+            <a:off x="7429880" y="219655"/>
+            <a:ext cx="4758945" cy="3059322"/>
           </a:xfrm>
           <a:prstGeom prst="rect">
             <a:avLst/>
@@ -12246,10 +14756,10 @@
       </p:pic>
       <p:pic>
         <p:nvPicPr>
-          <p:cNvPr id="9" name="Picture 8">
+          <p:cNvPr id="8" name="Picture 7" descr="A close up of a map&#10;&#10;Description automatically generated">
             <a:extLst>
               <a:ext uri="{FF2B5EF4-FFF2-40B4-BE49-F238E27FC236}">
-                <a16:creationId xmlns:a16="http://schemas.microsoft.com/office/drawing/2014/main" id="{8D047F4C-05DA-456C-9D46-CC0E29FD2DC5}"/>
+                <a16:creationId xmlns:a16="http://schemas.microsoft.com/office/drawing/2014/main" id="{6BF023E2-11DB-4F5C-92DB-1191DC60BCF8}"/>
               </a:ext>
             </a:extLst>
           </p:cNvPr>
@@ -12258,16 +14768,21 @@
           </p:cNvPicPr>
           <p:nvPr/>
         </p:nvPicPr>
-        <p:blipFill>
-          <a:blip r:embed="rId3"/>
-          <a:stretch>
-            <a:fillRect/>
-          </a:stretch>
+        <p:blipFill rotWithShape="1">
+          <a:blip r:embed="rId3">
+            <a:extLst>
+              <a:ext uri="{28A0092B-C50C-407E-A947-70E740481C1C}">
+                <a14:useLocalDpi xmlns:a14="http://schemas.microsoft.com/office/drawing/2010/main" val="0"/>
+              </a:ext>
+            </a:extLst>
+          </a:blip>
+          <a:srcRect t="14435"/>
+          <a:stretch/>
         </p:blipFill>
         <p:spPr>
           <a:xfrm>
-            <a:off x="2247334" y="2506807"/>
-            <a:ext cx="2447925" cy="942975"/>
+            <a:off x="7429880" y="3349517"/>
+            <a:ext cx="4758946" cy="2617733"/>
           </a:xfrm>
           <a:prstGeom prst="rect">
             <a:avLst/>
@@ -12277,7 +14792,7 @@
     </p:spTree>
     <p:extLst>
       <p:ext uri="{BB962C8B-B14F-4D97-AF65-F5344CB8AC3E}">
-        <p14:creationId xmlns:p14="http://schemas.microsoft.com/office/powerpoint/2010/main" val="3086997950"/>
+        <p14:creationId xmlns:p14="http://schemas.microsoft.com/office/powerpoint/2010/main" val="3092306748"/>
       </p:ext>
     </p:extLst>
   </p:cSld>
@@ -12304,78 +14819,12 @@
           <a:chExt cx="0" cy="0"/>
         </a:xfrm>
       </p:grpSpPr>
-      <p:sp>
-        <p:nvSpPr>
-          <p:cNvPr id="2" name="Title 1">
+      <p:pic>
+        <p:nvPicPr>
+          <p:cNvPr id="8" name="Picture 7" descr="A close up of a map&#10;&#10;Description automatically generated">
             <a:extLst>
               <a:ext uri="{FF2B5EF4-FFF2-40B4-BE49-F238E27FC236}">
-                <a16:creationId xmlns:a16="http://schemas.microsoft.com/office/drawing/2014/main" id="{D9E1E635-0156-46E2-B986-02DD8B123B5B}"/>
-              </a:ext>
-            </a:extLst>
-          </p:cNvPr>
-          <p:cNvSpPr>
-            <a:spLocks noGrp="1"/>
-          </p:cNvSpPr>
-          <p:nvPr>
-            <p:ph type="title"/>
-          </p:nvPr>
-        </p:nvSpPr>
-        <p:spPr>
-          <a:xfrm>
-            <a:off x="316800" y="230400"/>
-            <a:ext cx="10890180" cy="752400"/>
-          </a:xfrm>
-        </p:spPr>
-        <p:txBody>
-          <a:bodyPr/>
-          <a:lstStyle/>
-          <a:p>
-            <a:r>
-              <a:rPr lang="da-DK" dirty="0"/>
-              <a:t>Resultater – Alle markeder ÷ FCR</a:t>
-            </a:r>
-          </a:p>
-        </p:txBody>
-      </p:sp>
-      <p:sp>
-        <p:nvSpPr>
-          <p:cNvPr id="5" name="Date Placeholder 4">
-            <a:extLst>
-              <a:ext uri="{FF2B5EF4-FFF2-40B4-BE49-F238E27FC236}">
-                <a16:creationId xmlns:a16="http://schemas.microsoft.com/office/drawing/2014/main" id="{D6AAE5E1-4836-4FA6-829E-DCA29C874AC9}"/>
-              </a:ext>
-            </a:extLst>
-          </p:cNvPr>
-          <p:cNvSpPr>
-            <a:spLocks noGrp="1"/>
-          </p:cNvSpPr>
-          <p:nvPr>
-            <p:ph type="dt" sz="half" idx="15"/>
-          </p:nvPr>
-        </p:nvSpPr>
-        <p:spPr/>
-        <p:txBody>
-          <a:bodyPr/>
-          <a:lstStyle/>
-          <a:p>
-            <a:fld id="{63A1E821-CAB7-41B7-921A-53EE81194D27}" type="datetime1">
-              <a:rPr lang="da-DK" smtClean="0"/>
-              <a:t>20-04-2020</a:t>
-            </a:fld>
-            <a:r>
-              <a:rPr lang="da-DK"/>
-              <a:t>21-04-2020</a:t>
-            </a:r>
-            <a:endParaRPr lang="da-DK" dirty="0"/>
-          </a:p>
-        </p:txBody>
-      </p:sp>
-      <p:pic>
-        <p:nvPicPr>
-          <p:cNvPr id="6" name="Picture 5">
-            <a:extLst>
-              <a:ext uri="{FF2B5EF4-FFF2-40B4-BE49-F238E27FC236}">
-                <a16:creationId xmlns:a16="http://schemas.microsoft.com/office/drawing/2014/main" id="{0491E3A6-6CFE-4299-A360-3C3E9091BD1D}"/>
+                <a16:creationId xmlns:a16="http://schemas.microsoft.com/office/drawing/2014/main" id="{729A1E92-EBD0-48C2-9A34-14F0AC5E4523}"/>
               </a:ext>
             </a:extLst>
           </p:cNvPr>
@@ -12385,27 +14834,195 @@
           <p:nvPr/>
         </p:nvPicPr>
         <p:blipFill>
-          <a:blip r:embed="rId2"/>
+          <a:blip r:embed="rId2">
+            <a:extLst>
+              <a:ext uri="{28A0092B-C50C-407E-A947-70E740481C1C}">
+                <a14:useLocalDpi xmlns:a14="http://schemas.microsoft.com/office/drawing/2010/main" val="0"/>
+              </a:ext>
+            </a:extLst>
+          </a:blip>
           <a:stretch>
             <a:fillRect/>
           </a:stretch>
         </p:blipFill>
         <p:spPr>
           <a:xfrm>
-            <a:off x="2205980" y="2567558"/>
-            <a:ext cx="2362200" cy="933450"/>
+            <a:off x="7148888" y="2659770"/>
+            <a:ext cx="5036567" cy="3237793"/>
           </a:xfrm>
           <a:prstGeom prst="rect">
             <a:avLst/>
           </a:prstGeom>
         </p:spPr>
       </p:pic>
+      <p:sp>
+        <p:nvSpPr>
+          <p:cNvPr id="2" name="Title 1">
+            <a:extLst>
+              <a:ext uri="{FF2B5EF4-FFF2-40B4-BE49-F238E27FC236}">
+                <a16:creationId xmlns:a16="http://schemas.microsoft.com/office/drawing/2014/main" id="{7FA92126-4DD5-48A6-9282-17C261AAD86B}"/>
+              </a:ext>
+            </a:extLst>
+          </p:cNvPr>
+          <p:cNvSpPr>
+            <a:spLocks noGrp="1"/>
+          </p:cNvSpPr>
+          <p:nvPr>
+            <p:ph type="title"/>
+          </p:nvPr>
+        </p:nvSpPr>
+        <p:spPr/>
+        <p:txBody>
+          <a:bodyPr/>
+          <a:lstStyle/>
+          <a:p>
+            <a:r>
+              <a:rPr lang="da-DK" dirty="0" err="1"/>
+              <a:t>Afrr</a:t>
+            </a:r>
+            <a:r>
+              <a:rPr lang="da-DK" dirty="0"/>
+              <a:t> </a:t>
+            </a:r>
+            <a:r>
+              <a:rPr lang="da-DK" dirty="0" err="1"/>
+              <a:t>market</a:t>
+            </a:r>
+            <a:endParaRPr lang="da-DK" dirty="0"/>
+          </a:p>
+        </p:txBody>
+      </p:sp>
+      <p:sp>
+        <p:nvSpPr>
+          <p:cNvPr id="3" name="Content Placeholder 2">
+            <a:extLst>
+              <a:ext uri="{FF2B5EF4-FFF2-40B4-BE49-F238E27FC236}">
+                <a16:creationId xmlns:a16="http://schemas.microsoft.com/office/drawing/2014/main" id="{C098F7BD-1E6F-4405-BDBC-FD5B4783BC6F}"/>
+              </a:ext>
+            </a:extLst>
+          </p:cNvPr>
+          <p:cNvSpPr>
+            <a:spLocks noGrp="1"/>
+          </p:cNvSpPr>
+          <p:nvPr>
+            <p:ph idx="1"/>
+          </p:nvPr>
+        </p:nvSpPr>
+        <p:spPr>
+          <a:xfrm>
+            <a:off x="985838" y="1960079"/>
+            <a:ext cx="5108573" cy="3937484"/>
+          </a:xfrm>
+        </p:spPr>
+        <p:txBody>
+          <a:bodyPr/>
+          <a:lstStyle/>
+          <a:p>
+            <a:r>
+              <a:rPr lang="en-US" sz="1600" dirty="0" err="1"/>
+              <a:t>aFRR</a:t>
+            </a:r>
+            <a:r>
+              <a:rPr lang="en-US" sz="1600" dirty="0"/>
+              <a:t> (automatic frequency restoration reserve), also known as secondary reserves, is responsible for stabilizing the net frequency when FCR capacity has been activated for too long (15 min).</a:t>
+            </a:r>
+          </a:p>
+          <a:p>
+            <a:r>
+              <a:rPr lang="en-US" sz="1600" dirty="0"/>
+              <a:t>Units delivering </a:t>
+            </a:r>
+            <a:r>
+              <a:rPr lang="en-US" sz="1600" dirty="0" err="1"/>
+              <a:t>aFRR</a:t>
+            </a:r>
+            <a:r>
+              <a:rPr lang="en-US" sz="1600" dirty="0"/>
+              <a:t> must be capable of activating within 15 minutes.</a:t>
+            </a:r>
+          </a:p>
+          <a:p>
+            <a:r>
+              <a:rPr lang="en-US" sz="1600" dirty="0"/>
+              <a:t>When participating in the </a:t>
+            </a:r>
+            <a:r>
+              <a:rPr lang="en-US" sz="1600" dirty="0" err="1"/>
+              <a:t>aFRR</a:t>
+            </a:r>
+            <a:r>
+              <a:rPr lang="en-US" sz="1600" dirty="0"/>
+              <a:t> market a payment is received for the regulating power made available plus a payment for the regulated energy. </a:t>
+            </a:r>
+          </a:p>
+          <a:p>
+            <a:r>
+              <a:rPr lang="en-US" sz="1600" dirty="0"/>
+              <a:t>The </a:t>
+            </a:r>
+            <a:r>
+              <a:rPr lang="en-US" sz="1600" dirty="0" err="1"/>
+              <a:t>aFRR</a:t>
+            </a:r>
+            <a:r>
+              <a:rPr lang="en-US" sz="1600" dirty="0"/>
+              <a:t> product is symmetric in DK1.</a:t>
+            </a:r>
+          </a:p>
+          <a:p>
+            <a:r>
+              <a:rPr lang="en-US" sz="1600" dirty="0" err="1"/>
+              <a:t>aFRR</a:t>
+            </a:r>
+            <a:r>
+              <a:rPr lang="en-US" sz="1600" dirty="0"/>
+              <a:t> is purchased on monthly contracts, requiring commitment for the entire month.  </a:t>
+            </a:r>
+          </a:p>
+          <a:p>
+            <a:endParaRPr lang="en-US" sz="1600" dirty="0"/>
+          </a:p>
+        </p:txBody>
+      </p:sp>
+      <p:sp>
+        <p:nvSpPr>
+          <p:cNvPr id="4" name="Date Placeholder 3">
+            <a:extLst>
+              <a:ext uri="{FF2B5EF4-FFF2-40B4-BE49-F238E27FC236}">
+                <a16:creationId xmlns:a16="http://schemas.microsoft.com/office/drawing/2014/main" id="{BBCB6A79-9784-4C5F-BC99-747F87F67757}"/>
+              </a:ext>
+            </a:extLst>
+          </p:cNvPr>
+          <p:cNvSpPr>
+            <a:spLocks noGrp="1"/>
+          </p:cNvSpPr>
+          <p:nvPr>
+            <p:ph type="dt" sz="half" idx="10"/>
+          </p:nvPr>
+        </p:nvSpPr>
+        <p:spPr/>
+        <p:txBody>
+          <a:bodyPr/>
+          <a:lstStyle/>
+          <a:p>
+            <a:fld id="{7B09377E-F580-4BC6-8D1B-7EA2B73AFAC4}" type="datetime1">
+              <a:rPr lang="da-DK" smtClean="0"/>
+              <a:t>23-04-2020</a:t>
+            </a:fld>
+            <a:r>
+              <a:rPr lang="da-DK"/>
+              <a:t>21-04-2020</a:t>
+            </a:r>
+            <a:endParaRPr lang="da-DK" dirty="0"/>
+          </a:p>
+        </p:txBody>
+      </p:sp>
       <p:pic>
         <p:nvPicPr>
-          <p:cNvPr id="7" name="Picture 6">
+          <p:cNvPr id="6" name="Picture 5" descr="A screenshot of a cell phone&#10;&#10;Description automatically generated">
             <a:extLst>
               <a:ext uri="{FF2B5EF4-FFF2-40B4-BE49-F238E27FC236}">
-                <a16:creationId xmlns:a16="http://schemas.microsoft.com/office/drawing/2014/main" id="{8E84EACB-3DC8-4384-9656-44ABC971250C}"/>
+                <a16:creationId xmlns:a16="http://schemas.microsoft.com/office/drawing/2014/main" id="{320260DA-7F61-4B6F-BE6B-79D60E4CB0C3}"/>
               </a:ext>
             </a:extLst>
           </p:cNvPr>
@@ -12415,15 +15032,21 @@
           <p:nvPr/>
         </p:nvPicPr>
         <p:blipFill>
-          <a:blip r:embed="rId3"/>
+          <a:blip r:embed="rId3">
+            <a:extLst>
+              <a:ext uri="{28A0092B-C50C-407E-A947-70E740481C1C}">
+                <a14:useLocalDpi xmlns:a14="http://schemas.microsoft.com/office/drawing/2010/main" val="0"/>
+              </a:ext>
+            </a:extLst>
+          </a:blip>
           <a:stretch>
             <a:fillRect/>
           </a:stretch>
         </p:blipFill>
         <p:spPr>
           <a:xfrm>
-            <a:off x="7434708" y="2507729"/>
-            <a:ext cx="3124200" cy="1857375"/>
+            <a:off x="7152259" y="0"/>
+            <a:ext cx="5036566" cy="3237792"/>
           </a:xfrm>
           <a:prstGeom prst="rect">
             <a:avLst/>
@@ -12433,7 +15056,7 @@
     </p:spTree>
     <p:extLst>
       <p:ext uri="{BB962C8B-B14F-4D97-AF65-F5344CB8AC3E}">
-        <p14:creationId xmlns:p14="http://schemas.microsoft.com/office/powerpoint/2010/main" val="2437443758"/>
+        <p14:creationId xmlns:p14="http://schemas.microsoft.com/office/powerpoint/2010/main" val="2775705926"/>
       </p:ext>
     </p:extLst>
   </p:cSld>
@@ -12460,13 +15083,736 @@
           <a:chExt cx="0" cy="0"/>
         </a:xfrm>
       </p:grpSpPr>
+      <p:sp>
+        <p:nvSpPr>
+          <p:cNvPr id="2" name="Title 1">
+            <a:extLst>
+              <a:ext uri="{FF2B5EF4-FFF2-40B4-BE49-F238E27FC236}">
+                <a16:creationId xmlns:a16="http://schemas.microsoft.com/office/drawing/2014/main" id="{D32B855C-D0D1-4A17-BDCA-2A3D893BCF05}"/>
+              </a:ext>
+            </a:extLst>
+          </p:cNvPr>
+          <p:cNvSpPr>
+            <a:spLocks noGrp="1"/>
+          </p:cNvSpPr>
+          <p:nvPr>
+            <p:ph type="title"/>
+          </p:nvPr>
+        </p:nvSpPr>
+        <p:spPr/>
+        <p:txBody>
+          <a:bodyPr/>
+          <a:lstStyle/>
+          <a:p>
+            <a:r>
+              <a:rPr lang="en-US"/>
+              <a:t>Mfrr market</a:t>
+            </a:r>
+          </a:p>
+        </p:txBody>
+      </p:sp>
+      <p:sp>
+        <p:nvSpPr>
+          <p:cNvPr id="3" name="Content Placeholder 2">
+            <a:extLst>
+              <a:ext uri="{FF2B5EF4-FFF2-40B4-BE49-F238E27FC236}">
+                <a16:creationId xmlns:a16="http://schemas.microsoft.com/office/drawing/2014/main" id="{123CA47A-F5B6-4A71-9AA2-80E4B5F2E03A}"/>
+              </a:ext>
+            </a:extLst>
+          </p:cNvPr>
+          <p:cNvSpPr>
+            <a:spLocks noGrp="1"/>
+          </p:cNvSpPr>
+          <p:nvPr>
+            <p:ph idx="1"/>
+          </p:nvPr>
+        </p:nvSpPr>
+        <p:spPr>
+          <a:xfrm>
+            <a:off x="985839" y="1960079"/>
+            <a:ext cx="5108573" cy="3937484"/>
+          </a:xfrm>
+        </p:spPr>
+        <p:txBody>
+          <a:bodyPr/>
+          <a:lstStyle/>
+          <a:p>
+            <a:pPr>
+              <a:spcAft>
+                <a:spcPts val="600"/>
+              </a:spcAft>
+            </a:pPr>
+            <a:r>
+              <a:rPr lang="en-US" sz="1600" dirty="0"/>
+              <a:t>The </a:t>
+            </a:r>
+            <a:r>
+              <a:rPr lang="en-US" sz="1600" dirty="0" err="1"/>
+              <a:t>mFRR</a:t>
+            </a:r>
+            <a:r>
+              <a:rPr lang="en-US" sz="1600" dirty="0"/>
+              <a:t> (manual frequency restoration reserve) market, also referred to as tertiary reserves, is the slowest ancillary service purchased by </a:t>
+            </a:r>
+            <a:r>
+              <a:rPr lang="en-US" sz="1600" dirty="0" err="1"/>
+              <a:t>EnergiNet</a:t>
+            </a:r>
+            <a:r>
+              <a:rPr lang="en-US" sz="1600" dirty="0"/>
+              <a:t>. </a:t>
+            </a:r>
+            <a:r>
+              <a:rPr lang="en-US" sz="1600" dirty="0" err="1"/>
+              <a:t>mFRR</a:t>
+            </a:r>
+            <a:r>
+              <a:rPr lang="en-US" sz="1600" dirty="0"/>
+              <a:t> is activated to free up </a:t>
+            </a:r>
+            <a:r>
+              <a:rPr lang="en-US" sz="1600" dirty="0" err="1"/>
+              <a:t>aFRR</a:t>
+            </a:r>
+            <a:r>
+              <a:rPr lang="en-US" sz="1600" dirty="0"/>
+              <a:t>. </a:t>
+            </a:r>
+            <a:r>
+              <a:rPr lang="en-US" sz="1600" dirty="0" err="1"/>
+              <a:t>mFRR</a:t>
+            </a:r>
+            <a:r>
+              <a:rPr lang="en-US" sz="1600" dirty="0"/>
+              <a:t> is used to balance the market over longer periods of time e.g. in the case of power plant failure etc. </a:t>
+            </a:r>
+          </a:p>
+          <a:p>
+            <a:pPr>
+              <a:spcAft>
+                <a:spcPts val="600"/>
+              </a:spcAft>
+            </a:pPr>
+            <a:r>
+              <a:rPr lang="en-US" sz="1600" dirty="0"/>
+              <a:t>Units participating in the </a:t>
+            </a:r>
+            <a:r>
+              <a:rPr lang="en-US" sz="1600" dirty="0" err="1"/>
+              <a:t>mFRR</a:t>
+            </a:r>
+            <a:r>
+              <a:rPr lang="en-US" sz="1600" dirty="0"/>
+              <a:t> market must be capable of activating within 15 minutes</a:t>
+            </a:r>
+          </a:p>
+          <a:p>
+            <a:pPr>
+              <a:spcAft>
+                <a:spcPts val="600"/>
+              </a:spcAft>
+            </a:pPr>
+            <a:r>
+              <a:rPr lang="en-US" sz="1600" dirty="0"/>
+              <a:t>Payment is received for regulating power made available, plus for the regulated energy. </a:t>
+            </a:r>
+          </a:p>
+          <a:p>
+            <a:pPr>
+              <a:spcAft>
+                <a:spcPts val="600"/>
+              </a:spcAft>
+            </a:pPr>
+            <a:r>
+              <a:rPr lang="en-US" sz="1600" dirty="0" err="1"/>
+              <a:t>mFRR</a:t>
+            </a:r>
+            <a:r>
+              <a:rPr lang="en-US" sz="1600" dirty="0"/>
+              <a:t> is only purchased as up regulation </a:t>
+            </a:r>
+          </a:p>
+          <a:p>
+            <a:pPr>
+              <a:spcAft>
+                <a:spcPts val="600"/>
+              </a:spcAft>
+            </a:pPr>
+            <a:endParaRPr lang="en-US" sz="1600" dirty="0"/>
+          </a:p>
+        </p:txBody>
+      </p:sp>
+      <p:sp>
+        <p:nvSpPr>
+          <p:cNvPr id="4" name="Date Placeholder 3">
+            <a:extLst>
+              <a:ext uri="{FF2B5EF4-FFF2-40B4-BE49-F238E27FC236}">
+                <a16:creationId xmlns:a16="http://schemas.microsoft.com/office/drawing/2014/main" id="{624802FB-E8A5-4880-9C4B-5BFA6FE5910F}"/>
+              </a:ext>
+            </a:extLst>
+          </p:cNvPr>
+          <p:cNvSpPr>
+            <a:spLocks noGrp="1"/>
+          </p:cNvSpPr>
+          <p:nvPr>
+            <p:ph type="dt" sz="half" idx="10"/>
+          </p:nvPr>
+        </p:nvSpPr>
+        <p:spPr/>
+        <p:txBody>
+          <a:bodyPr/>
+          <a:lstStyle/>
+          <a:p>
+            <a:fld id="{4083C415-212E-474D-A76A-78E15820847E}" type="datetime1">
+              <a:rPr lang="da-DK" smtClean="0"/>
+              <a:t>23-04-2020</a:t>
+            </a:fld>
+            <a:r>
+              <a:rPr lang="da-DK"/>
+              <a:t>21-04-2020</a:t>
+            </a:r>
+            <a:endParaRPr lang="da-DK" dirty="0"/>
+          </a:p>
+        </p:txBody>
+      </p:sp>
+      <p:pic>
+        <p:nvPicPr>
+          <p:cNvPr id="8" name="Picture 7" descr="A screenshot of text&#10;&#10;Description automatically generated">
+            <a:extLst>
+              <a:ext uri="{FF2B5EF4-FFF2-40B4-BE49-F238E27FC236}">
+                <a16:creationId xmlns:a16="http://schemas.microsoft.com/office/drawing/2014/main" id="{4D3274A0-3F97-45E5-B01C-571CD0F51C72}"/>
+              </a:ext>
+            </a:extLst>
+          </p:cNvPr>
+          <p:cNvPicPr>
+            <a:picLocks noChangeAspect="1"/>
+          </p:cNvPicPr>
+          <p:nvPr/>
+        </p:nvPicPr>
+        <p:blipFill>
+          <a:blip r:embed="rId2">
+            <a:extLst>
+              <a:ext uri="{28A0092B-C50C-407E-A947-70E740481C1C}">
+                <a14:useLocalDpi xmlns:a14="http://schemas.microsoft.com/office/drawing/2010/main" val="0"/>
+              </a:ext>
+            </a:extLst>
+          </a:blip>
+          <a:stretch>
+            <a:fillRect/>
+          </a:stretch>
+        </p:blipFill>
+        <p:spPr>
+          <a:xfrm>
+            <a:off x="7429879" y="2838241"/>
+            <a:ext cx="4758945" cy="3059322"/>
+          </a:xfrm>
+          <a:prstGeom prst="rect">
+            <a:avLst/>
+          </a:prstGeom>
+        </p:spPr>
+      </p:pic>
+      <p:pic>
+        <p:nvPicPr>
+          <p:cNvPr id="10" name="Picture 9" descr="A screenshot of a cell phone&#10;&#10;Description automatically generated">
+            <a:extLst>
+              <a:ext uri="{FF2B5EF4-FFF2-40B4-BE49-F238E27FC236}">
+                <a16:creationId xmlns:a16="http://schemas.microsoft.com/office/drawing/2014/main" id="{8815397C-6CA6-4C89-A23F-19AA37742ADE}"/>
+              </a:ext>
+            </a:extLst>
+          </p:cNvPr>
+          <p:cNvPicPr>
+            <a:picLocks noChangeAspect="1"/>
+          </p:cNvPicPr>
+          <p:nvPr/>
+        </p:nvPicPr>
+        <p:blipFill>
+          <a:blip r:embed="rId3">
+            <a:extLst>
+              <a:ext uri="{28A0092B-C50C-407E-A947-70E740481C1C}">
+                <a14:useLocalDpi xmlns:a14="http://schemas.microsoft.com/office/drawing/2010/main" val="0"/>
+              </a:ext>
+            </a:extLst>
+          </a:blip>
+          <a:stretch>
+            <a:fillRect/>
+          </a:stretch>
+        </p:blipFill>
+        <p:spPr>
+          <a:xfrm>
+            <a:off x="7429879" y="149115"/>
+            <a:ext cx="4758946" cy="3059322"/>
+          </a:xfrm>
+          <a:prstGeom prst="rect">
+            <a:avLst/>
+          </a:prstGeom>
+        </p:spPr>
+      </p:pic>
     </p:spTree>
-    <p:custDataLst>
-      <p:tags r:id="rId1"/>
-    </p:custDataLst>
     <p:extLst>
       <p:ext uri="{BB962C8B-B14F-4D97-AF65-F5344CB8AC3E}">
-        <p14:creationId xmlns:p14="http://schemas.microsoft.com/office/powerpoint/2010/main" val="2139698179"/>
+        <p14:creationId xmlns:p14="http://schemas.microsoft.com/office/powerpoint/2010/main" val="3046925894"/>
+      </p:ext>
+    </p:extLst>
+  </p:cSld>
+  <p:clrMapOvr>
+    <a:masterClrMapping/>
+  </p:clrMapOvr>
+</p:sld>
+</file>
+
+<file path=ppt/slides/slide8.xml><?xml version="1.0" encoding="utf-8"?>
+<p:sld xmlns:a="http://schemas.openxmlformats.org/drawingml/2006/main" xmlns:r="http://schemas.openxmlformats.org/officeDocument/2006/relationships" xmlns:p="http://schemas.openxmlformats.org/presentationml/2006/main">
+  <p:cSld>
+    <p:spTree>
+      <p:nvGrpSpPr>
+        <p:cNvPr id="1" name=""/>
+        <p:cNvGrpSpPr/>
+        <p:nvPr/>
+      </p:nvGrpSpPr>
+      <p:grpSpPr>
+        <a:xfrm>
+          <a:off x="0" y="0"/>
+          <a:ext cx="0" cy="0"/>
+          <a:chOff x="0" y="0"/>
+          <a:chExt cx="0" cy="0"/>
+        </a:xfrm>
+      </p:grpSpPr>
+      <p:pic>
+        <p:nvPicPr>
+          <p:cNvPr id="8" name="Picture 7" descr="A close up of a map&#10;&#10;Description automatically generated">
+            <a:extLst>
+              <a:ext uri="{FF2B5EF4-FFF2-40B4-BE49-F238E27FC236}">
+                <a16:creationId xmlns:a16="http://schemas.microsoft.com/office/drawing/2014/main" id="{55C2AAE3-551B-478B-8DBD-2A57D0F77F48}"/>
+              </a:ext>
+            </a:extLst>
+          </p:cNvPr>
+          <p:cNvPicPr>
+            <a:picLocks noChangeAspect="1"/>
+          </p:cNvPicPr>
+          <p:nvPr/>
+        </p:nvPicPr>
+        <p:blipFill>
+          <a:blip r:embed="rId2">
+            <a:extLst>
+              <a:ext uri="{28A0092B-C50C-407E-A947-70E740481C1C}">
+                <a14:useLocalDpi xmlns:a14="http://schemas.microsoft.com/office/drawing/2010/main" val="0"/>
+              </a:ext>
+            </a:extLst>
+          </a:blip>
+          <a:stretch>
+            <a:fillRect/>
+          </a:stretch>
+        </p:blipFill>
+        <p:spPr>
+          <a:xfrm>
+            <a:off x="7429880" y="2924944"/>
+            <a:ext cx="4758945" cy="3059322"/>
+          </a:xfrm>
+          <a:prstGeom prst="rect">
+            <a:avLst/>
+          </a:prstGeom>
+        </p:spPr>
+      </p:pic>
+      <p:sp>
+        <p:nvSpPr>
+          <p:cNvPr id="2" name="Title 1">
+            <a:extLst>
+              <a:ext uri="{FF2B5EF4-FFF2-40B4-BE49-F238E27FC236}">
+                <a16:creationId xmlns:a16="http://schemas.microsoft.com/office/drawing/2014/main" id="{DDA42E1B-A9D4-4E0A-B054-0B7DAFE7A2A1}"/>
+              </a:ext>
+            </a:extLst>
+          </p:cNvPr>
+          <p:cNvSpPr>
+            <a:spLocks noGrp="1"/>
+          </p:cNvSpPr>
+          <p:nvPr>
+            <p:ph type="title"/>
+          </p:nvPr>
+        </p:nvSpPr>
+        <p:spPr/>
+        <p:txBody>
+          <a:bodyPr/>
+          <a:lstStyle/>
+          <a:p>
+            <a:r>
+              <a:rPr lang="en-US"/>
+              <a:t>Special regulation</a:t>
+            </a:r>
+          </a:p>
+        </p:txBody>
+      </p:sp>
+      <p:sp>
+        <p:nvSpPr>
+          <p:cNvPr id="3" name="Content Placeholder 2">
+            <a:extLst>
+              <a:ext uri="{FF2B5EF4-FFF2-40B4-BE49-F238E27FC236}">
+                <a16:creationId xmlns:a16="http://schemas.microsoft.com/office/drawing/2014/main" id="{5BF4DB64-4B33-4188-8311-DBB69F652D1A}"/>
+              </a:ext>
+            </a:extLst>
+          </p:cNvPr>
+          <p:cNvSpPr>
+            <a:spLocks noGrp="1"/>
+          </p:cNvSpPr>
+          <p:nvPr>
+            <p:ph idx="1"/>
+          </p:nvPr>
+        </p:nvSpPr>
+        <p:spPr>
+          <a:xfrm>
+            <a:off x="985839" y="1960079"/>
+            <a:ext cx="5108573" cy="3937484"/>
+          </a:xfrm>
+        </p:spPr>
+        <p:txBody>
+          <a:bodyPr/>
+          <a:lstStyle/>
+          <a:p>
+            <a:r>
+              <a:rPr lang="en-US" sz="1600" dirty="0"/>
+              <a:t>Special regulation is an alternative to </a:t>
+            </a:r>
+            <a:r>
+              <a:rPr lang="en-US" sz="1600" dirty="0" err="1"/>
+              <a:t>mFRR</a:t>
+            </a:r>
+            <a:r>
+              <a:rPr lang="en-US" sz="1600" dirty="0"/>
+              <a:t>, purchased when technical challenges in stabilizing the electricity grid occurs. The primary reason for the purchase of special regulation in DK1 is a result of overproduction from wind turbines in northern Germany, combined with bottlenecks in the German electricity grid. </a:t>
+            </a:r>
+          </a:p>
+          <a:p>
+            <a:r>
+              <a:rPr lang="en-US" sz="1600" dirty="0"/>
+              <a:t>Special regulation is primarily purchased as down regulation.</a:t>
+            </a:r>
+          </a:p>
+          <a:p>
+            <a:r>
+              <a:rPr lang="en-US" sz="1600" dirty="0"/>
+              <a:t>Payment is received only for the regulated energy. </a:t>
+            </a:r>
+          </a:p>
+          <a:p>
+            <a:r>
+              <a:rPr lang="en-US" sz="1600" dirty="0"/>
+              <a:t>Special regulation is not purchased in all hours of the year. </a:t>
+            </a:r>
+          </a:p>
+        </p:txBody>
+      </p:sp>
+      <p:sp>
+        <p:nvSpPr>
+          <p:cNvPr id="4" name="Date Placeholder 3">
+            <a:extLst>
+              <a:ext uri="{FF2B5EF4-FFF2-40B4-BE49-F238E27FC236}">
+                <a16:creationId xmlns:a16="http://schemas.microsoft.com/office/drawing/2014/main" id="{7F3674EE-1F6D-4622-BC31-26A153A2E704}"/>
+              </a:ext>
+            </a:extLst>
+          </p:cNvPr>
+          <p:cNvSpPr>
+            <a:spLocks noGrp="1"/>
+          </p:cNvSpPr>
+          <p:nvPr>
+            <p:ph type="dt" sz="half" idx="10"/>
+          </p:nvPr>
+        </p:nvSpPr>
+        <p:spPr/>
+        <p:txBody>
+          <a:bodyPr/>
+          <a:lstStyle/>
+          <a:p>
+            <a:fld id="{09E13F4E-5183-43F5-B6A9-18AB7B821BCC}" type="datetime1">
+              <a:rPr lang="da-DK" smtClean="0"/>
+              <a:t>23-04-2020</a:t>
+            </a:fld>
+            <a:r>
+              <a:rPr lang="da-DK"/>
+              <a:t>21-04-2020</a:t>
+            </a:r>
+            <a:endParaRPr lang="da-DK" dirty="0"/>
+          </a:p>
+        </p:txBody>
+      </p:sp>
+      <p:pic>
+        <p:nvPicPr>
+          <p:cNvPr id="6" name="Picture 5" descr="A screenshot of a cell phone&#10;&#10;Description automatically generated">
+            <a:extLst>
+              <a:ext uri="{FF2B5EF4-FFF2-40B4-BE49-F238E27FC236}">
+                <a16:creationId xmlns:a16="http://schemas.microsoft.com/office/drawing/2014/main" id="{3A32CE91-3372-4F6D-8398-246E6A115784}"/>
+              </a:ext>
+            </a:extLst>
+          </p:cNvPr>
+          <p:cNvPicPr>
+            <a:picLocks noChangeAspect="1"/>
+          </p:cNvPicPr>
+          <p:nvPr/>
+        </p:nvPicPr>
+        <p:blipFill>
+          <a:blip r:embed="rId3">
+            <a:extLst>
+              <a:ext uri="{28A0092B-C50C-407E-A947-70E740481C1C}">
+                <a14:useLocalDpi xmlns:a14="http://schemas.microsoft.com/office/drawing/2010/main" val="0"/>
+              </a:ext>
+            </a:extLst>
+          </a:blip>
+          <a:stretch>
+            <a:fillRect/>
+          </a:stretch>
+        </p:blipFill>
+        <p:spPr>
+          <a:xfrm>
+            <a:off x="7429880" y="209279"/>
+            <a:ext cx="4758945" cy="3059322"/>
+          </a:xfrm>
+          <a:prstGeom prst="rect">
+            <a:avLst/>
+          </a:prstGeom>
+        </p:spPr>
+      </p:pic>
+    </p:spTree>
+    <p:extLst>
+      <p:ext uri="{BB962C8B-B14F-4D97-AF65-F5344CB8AC3E}">
+        <p14:creationId xmlns:p14="http://schemas.microsoft.com/office/powerpoint/2010/main" val="3439089294"/>
+      </p:ext>
+    </p:extLst>
+  </p:cSld>
+  <p:clrMapOvr>
+    <a:masterClrMapping/>
+  </p:clrMapOvr>
+</p:sld>
+</file>
+
+<file path=ppt/slides/slide9.xml><?xml version="1.0" encoding="utf-8"?>
+<p:sld xmlns:a="http://schemas.openxmlformats.org/drawingml/2006/main" xmlns:r="http://schemas.openxmlformats.org/officeDocument/2006/relationships" xmlns:p="http://schemas.openxmlformats.org/presentationml/2006/main">
+  <p:cSld>
+    <p:spTree>
+      <p:nvGrpSpPr>
+        <p:cNvPr id="1" name=""/>
+        <p:cNvGrpSpPr/>
+        <p:nvPr/>
+      </p:nvGrpSpPr>
+      <p:grpSpPr>
+        <a:xfrm>
+          <a:off x="0" y="0"/>
+          <a:ext cx="0" cy="0"/>
+          <a:chOff x="0" y="0"/>
+          <a:chExt cx="0" cy="0"/>
+        </a:xfrm>
+      </p:grpSpPr>
+      <p:pic>
+        <p:nvPicPr>
+          <p:cNvPr id="13" name="Picture 12" descr="A screenshot of a cell phone&#10;&#10;Description automatically generated">
+            <a:extLst>
+              <a:ext uri="{FF2B5EF4-FFF2-40B4-BE49-F238E27FC236}">
+                <a16:creationId xmlns:a16="http://schemas.microsoft.com/office/drawing/2014/main" id="{28E3E04C-467A-4637-80EA-A12BB34137AF}"/>
+              </a:ext>
+            </a:extLst>
+          </p:cNvPr>
+          <p:cNvPicPr>
+            <a:picLocks noChangeAspect="1"/>
+          </p:cNvPicPr>
+          <p:nvPr/>
+        </p:nvPicPr>
+        <p:blipFill>
+          <a:blip r:embed="rId2">
+            <a:extLst>
+              <a:ext uri="{28A0092B-C50C-407E-A947-70E740481C1C}">
+                <a14:useLocalDpi xmlns:a14="http://schemas.microsoft.com/office/drawing/2010/main" val="0"/>
+              </a:ext>
+            </a:extLst>
+          </a:blip>
+          <a:stretch>
+            <a:fillRect/>
+          </a:stretch>
+        </p:blipFill>
+        <p:spPr>
+          <a:xfrm>
+            <a:off x="7429880" y="2838240"/>
+            <a:ext cx="4758947" cy="3059323"/>
+          </a:xfrm>
+          <a:prstGeom prst="rect">
+            <a:avLst/>
+          </a:prstGeom>
+        </p:spPr>
+      </p:pic>
+      <p:sp>
+        <p:nvSpPr>
+          <p:cNvPr id="2" name="Title 1">
+            <a:extLst>
+              <a:ext uri="{FF2B5EF4-FFF2-40B4-BE49-F238E27FC236}">
+                <a16:creationId xmlns:a16="http://schemas.microsoft.com/office/drawing/2014/main" id="{903D8F4A-B81A-409B-9211-103E61CAA880}"/>
+              </a:ext>
+            </a:extLst>
+          </p:cNvPr>
+          <p:cNvSpPr>
+            <a:spLocks noGrp="1"/>
+          </p:cNvSpPr>
+          <p:nvPr>
+            <p:ph type="title"/>
+          </p:nvPr>
+        </p:nvSpPr>
+        <p:spPr/>
+        <p:txBody>
+          <a:bodyPr/>
+          <a:lstStyle/>
+          <a:p>
+            <a:r>
+              <a:rPr lang="en-US" dirty="0"/>
+              <a:t>Secondary markets </a:t>
+            </a:r>
+          </a:p>
+        </p:txBody>
+      </p:sp>
+      <p:sp>
+        <p:nvSpPr>
+          <p:cNvPr id="3" name="Content Placeholder 2">
+            <a:extLst>
+              <a:ext uri="{FF2B5EF4-FFF2-40B4-BE49-F238E27FC236}">
+                <a16:creationId xmlns:a16="http://schemas.microsoft.com/office/drawing/2014/main" id="{0BD8DE9F-A739-4553-A6E8-618C2D4BD6A8}"/>
+              </a:ext>
+            </a:extLst>
+          </p:cNvPr>
+          <p:cNvSpPr>
+            <a:spLocks noGrp="1"/>
+          </p:cNvSpPr>
+          <p:nvPr>
+            <p:ph idx="1"/>
+          </p:nvPr>
+        </p:nvSpPr>
+        <p:spPr>
+          <a:xfrm>
+            <a:off x="985839" y="1960079"/>
+            <a:ext cx="5108574" cy="3937484"/>
+          </a:xfrm>
+        </p:spPr>
+        <p:txBody>
+          <a:bodyPr/>
+          <a:lstStyle/>
+          <a:p>
+            <a:r>
+              <a:rPr lang="en-US" sz="1600" dirty="0"/>
+              <a:t>In this model, the hydrogen and district heating markets are considered as secondary markets. </a:t>
+            </a:r>
+          </a:p>
+          <a:p>
+            <a:r>
+              <a:rPr lang="en-US" sz="1600" dirty="0"/>
+              <a:t>The district heating price is provided by </a:t>
+            </a:r>
+            <a:r>
+              <a:rPr lang="en-US" sz="1600" dirty="0" err="1"/>
+              <a:t>Århus</a:t>
+            </a:r>
+            <a:r>
+              <a:rPr lang="en-US" sz="1600" dirty="0"/>
+              <a:t> </a:t>
+            </a:r>
+            <a:r>
+              <a:rPr lang="en-US" sz="1600" dirty="0" err="1"/>
+              <a:t>affald</a:t>
+            </a:r>
+            <a:r>
+              <a:rPr lang="en-US" sz="1600" dirty="0"/>
+              <a:t>/</a:t>
+            </a:r>
+            <a:r>
+              <a:rPr lang="en-US" sz="1600" dirty="0" err="1"/>
+              <a:t>varme</a:t>
+            </a:r>
+            <a:r>
+              <a:rPr lang="en-US" sz="1600" dirty="0"/>
+              <a:t> for 2020, and is used for all simulated years. </a:t>
+            </a:r>
+          </a:p>
+          <a:p>
+            <a:r>
+              <a:rPr lang="en-US" sz="1600" dirty="0"/>
+              <a:t>The hydrogen price is calculated as the price of producing hydrogen with an </a:t>
+            </a:r>
+            <a:r>
+              <a:rPr lang="en-US" sz="1600" dirty="0" err="1"/>
+              <a:t>electrolyzer</a:t>
+            </a:r>
+            <a:r>
+              <a:rPr lang="en-US" sz="1600" dirty="0"/>
+              <a:t> plant in the 6000 cheapest hours of the year. An efficiency of 100 kW el/kg hydrogen is used. The hydrogen price is kept fixed during the entire simulation. </a:t>
+            </a:r>
+          </a:p>
+        </p:txBody>
+      </p:sp>
+      <p:sp>
+        <p:nvSpPr>
+          <p:cNvPr id="4" name="Date Placeholder 3">
+            <a:extLst>
+              <a:ext uri="{FF2B5EF4-FFF2-40B4-BE49-F238E27FC236}">
+                <a16:creationId xmlns:a16="http://schemas.microsoft.com/office/drawing/2014/main" id="{C31A5BFC-54B9-4B63-92FC-9BB8B6DF6ED4}"/>
+              </a:ext>
+            </a:extLst>
+          </p:cNvPr>
+          <p:cNvSpPr>
+            <a:spLocks noGrp="1"/>
+          </p:cNvSpPr>
+          <p:nvPr>
+            <p:ph type="dt" sz="half" idx="10"/>
+          </p:nvPr>
+        </p:nvSpPr>
+        <p:spPr/>
+        <p:txBody>
+          <a:bodyPr/>
+          <a:lstStyle/>
+          <a:p>
+            <a:fld id="{0058A574-448F-4C6D-8733-79D90E746495}" type="datetime1">
+              <a:rPr lang="da-DK" smtClean="0"/>
+              <a:t>23-04-2020</a:t>
+            </a:fld>
+            <a:r>
+              <a:rPr lang="da-DK"/>
+              <a:t>21-04-2020</a:t>
+            </a:r>
+            <a:endParaRPr lang="da-DK" dirty="0"/>
+          </a:p>
+        </p:txBody>
+      </p:sp>
+      <p:pic>
+        <p:nvPicPr>
+          <p:cNvPr id="8" name="Picture 7" descr="A screenshot of a cell phone&#10;&#10;Description automatically generated">
+            <a:extLst>
+              <a:ext uri="{FF2B5EF4-FFF2-40B4-BE49-F238E27FC236}">
+                <a16:creationId xmlns:a16="http://schemas.microsoft.com/office/drawing/2014/main" id="{6FCD4087-97F8-4373-BC6B-628C10C73723}"/>
+              </a:ext>
+            </a:extLst>
+          </p:cNvPr>
+          <p:cNvPicPr>
+            <a:picLocks noChangeAspect="1"/>
+          </p:cNvPicPr>
+          <p:nvPr/>
+        </p:nvPicPr>
+        <p:blipFill>
+          <a:blip r:embed="rId3">
+            <a:extLst>
+              <a:ext uri="{28A0092B-C50C-407E-A947-70E740481C1C}">
+                <a14:useLocalDpi xmlns:a14="http://schemas.microsoft.com/office/drawing/2010/main" val="0"/>
+              </a:ext>
+            </a:extLst>
+          </a:blip>
+          <a:stretch>
+            <a:fillRect/>
+          </a:stretch>
+        </p:blipFill>
+        <p:spPr>
+          <a:xfrm>
+            <a:off x="7429880" y="369677"/>
+            <a:ext cx="4758947" cy="3059323"/>
+          </a:xfrm>
+          <a:prstGeom prst="rect">
+            <a:avLst/>
+          </a:prstGeom>
+        </p:spPr>
+      </p:pic>
+    </p:spTree>
+    <p:extLst>
+      <p:ext uri="{BB962C8B-B14F-4D97-AF65-F5344CB8AC3E}">
+        <p14:creationId xmlns:p14="http://schemas.microsoft.com/office/powerpoint/2010/main" val="2603882419"/>
       </p:ext>
     </p:extLst>
   </p:cSld>

</xml_diff>